<commit_message>
Added methods figure to EB poster
</commit_message>
<xml_diff>
--- a/EB/EB2022Posterv1_Lamers.pptx
+++ b/EB/EB2022Posterv1_Lamers.pptx
@@ -238,7 +238,7 @@
           <a:p>
             <a:fld id="{BEBB2256-B637-B240-AA1D-93430E873738}" type="datetimeFigureOut">
               <a:rPr lang="en-US" smtClean="0"/>
-              <a:t>2/25/2022</a:t>
+              <a:t>3/3/2022</a:t>
             </a:fld>
             <a:endParaRPr lang="en-US"/>
           </a:p>
@@ -2307,7 +2307,7 @@
             <a:pPr marL="0" indent="0" algn="just">
               <a:buNone/>
             </a:pPr>
-            <a:endParaRPr lang="en-US" dirty="0" smtClean="0"/>
+            <a:endParaRPr lang="en-US" dirty="0"/>
           </a:p>
         </p:txBody>
       </p:sp>
@@ -2530,7 +2530,7 @@
               <a:defRPr/>
             </a:pPr>
             <a:r>
-              <a:rPr lang="en-US" sz="2800" b="1" dirty="0" smtClean="0"/>
+              <a:rPr lang="en-US" sz="2800" b="1" dirty="0"/>
               <a:t>Jacob Lamers: jjlamers@wisc.edu</a:t>
             </a:r>
           </a:p>
@@ -2539,12 +2539,8 @@
               <a:defRPr/>
             </a:pPr>
             <a:r>
-              <a:rPr lang="en-US" sz="2800" b="1" dirty="0" smtClean="0"/>
-              <a:t>Marlowe </a:t>
-            </a:r>
-            <a:r>
               <a:rPr lang="en-US" sz="2800" b="1" dirty="0"/>
-              <a:t>Eldridge, MD PhD: meldridge@pediatrics.wisc.edu</a:t>
+              <a:t>Marlowe Eldridge, MD PhD: meldridge@pediatrics.wisc.edu</a:t>
             </a:r>
           </a:p>
           <a:p>
@@ -2835,10 +2831,9 @@
           </a:lstStyle>
           <a:p>
             <a:r>
-              <a:rPr lang="en-US" altLang="en-US" dirty="0" smtClean="0"/>
+              <a:rPr lang="en-US" altLang="en-US" dirty="0"/>
               <a:t>Results (cont.)</a:t>
             </a:r>
-            <a:endParaRPr lang="en-US" altLang="en-US" dirty="0"/>
           </a:p>
         </p:txBody>
       </p:sp>
@@ -3554,18 +3549,13 @@
           <a:lstStyle/>
           <a:p>
             <a:r>
-              <a:rPr lang="en-US" dirty="0" smtClean="0">
+              <a:rPr lang="en-US" dirty="0">
                 <a:solidFill>
                   <a:schemeClr val="bg1"/>
                 </a:solidFill>
               </a:rPr>
               <a:t>a</a:t>
             </a:r>
-            <a:endParaRPr lang="en-US" dirty="0">
-              <a:solidFill>
-                <a:schemeClr val="bg1"/>
-              </a:solidFill>
-            </a:endParaRPr>
           </a:p>
         </p:txBody>
       </p:sp>
@@ -3898,6 +3888,36 @@
           </a:prstGeom>
         </p:spPr>
       </p:pic>
+      <p:pic>
+        <p:nvPicPr>
+          <p:cNvPr id="10" name="Picture 9" descr="Diagram&#10;&#10;Description automatically generated">
+            <a:extLst>
+              <a:ext uri="{FF2B5EF4-FFF2-40B4-BE49-F238E27FC236}">
+                <a16:creationId xmlns:a16="http://schemas.microsoft.com/office/drawing/2014/main" id="{72F63C7F-644E-41DD-8227-ACD6B2A51C1D}"/>
+              </a:ext>
+            </a:extLst>
+          </p:cNvPr>
+          <p:cNvPicPr>
+            <a:picLocks noChangeAspect="1"/>
+          </p:cNvPicPr>
+          <p:nvPr/>
+        </p:nvPicPr>
+        <p:blipFill>
+          <a:blip r:embed="rId11"/>
+          <a:stretch>
+            <a:fillRect/>
+          </a:stretch>
+        </p:blipFill>
+        <p:spPr>
+          <a:xfrm>
+            <a:off x="937849" y="19526723"/>
+            <a:ext cx="13261226" cy="8002464"/>
+          </a:xfrm>
+          <a:prstGeom prst="rect">
+            <a:avLst/>
+          </a:prstGeom>
+        </p:spPr>
+      </p:pic>
     </p:spTree>
     <p:extLst>
       <p:ext uri="{BB962C8B-B14F-4D97-AF65-F5344CB8AC3E}">
@@ -3908,13 +3928,6 @@
   <p:clrMapOvr>
     <a:masterClrMapping/>
   </p:clrMapOvr>
-  <p:timing>
-    <p:tnLst>
-      <p:par>
-        <p:cTn id="1" dur="indefinite" restart="never" nodeType="tmRoot"/>
-      </p:par>
-    </p:tnLst>
-  </p:timing>
 </p:sld>
 </file>
 

</xml_diff>

<commit_message>
Added text for conclusion and aims to EB powerpoint
</commit_message>
<xml_diff>
--- a/EB/EB2022Posterv1_Lamers.pptx
+++ b/EB/EB2022Posterv1_Lamers.pptx
@@ -238,7 +238,7 @@
           <a:p>
             <a:fld id="{BEBB2256-B637-B240-AA1D-93430E873738}" type="datetimeFigureOut">
               <a:rPr lang="en-US" smtClean="0"/>
-              <a:t>3/3/2022</a:t>
+              <a:t>3/14/2022</a:t>
             </a:fld>
             <a:endParaRPr lang="en-US"/>
           </a:p>
@@ -1313,7 +1313,10 @@
           <a:bodyPr rtlCol="0" anchor="ctr"/>
           <a:lstStyle/>
           <a:p>
-            <a:pPr algn="ctr"/>
+            <a:pPr marL="285750" indent="-285750" algn="ctr">
+              <a:buFont typeface="Arial" panose="020B0604020202020204" pitchFamily="34" charset="0"/>
+              <a:buChar char="•"/>
+            </a:pPr>
             <a:endParaRPr lang="en-US" dirty="0"/>
           </a:p>
         </p:txBody>
@@ -2847,7 +2850,7 @@
         </p:nvSpPr>
         <p:spPr bwMode="auto">
           <a:xfrm>
-            <a:off x="29598386" y="20503746"/>
+            <a:off x="29598386" y="20503747"/>
             <a:ext cx="13716000" cy="1181861"/>
           </a:xfrm>
           <a:prstGeom prst="rect">
@@ -3063,7 +3066,7 @@
         </p:nvSpPr>
         <p:spPr bwMode="auto">
           <a:xfrm>
-            <a:off x="650271" y="13974295"/>
+            <a:off x="650271" y="14888694"/>
             <a:ext cx="13716000" cy="1181861"/>
           </a:xfrm>
           <a:prstGeom prst="rect">
@@ -3171,7 +3174,7 @@
         </p:nvSpPr>
         <p:spPr bwMode="auto">
           <a:xfrm>
-            <a:off x="663039" y="17829296"/>
+            <a:off x="663039" y="19012633"/>
             <a:ext cx="13716000" cy="1181861"/>
           </a:xfrm>
           <a:prstGeom prst="rect">
@@ -3790,8 +3793,8 @@
         </p:blipFill>
         <p:spPr>
           <a:xfrm>
-            <a:off x="35089589" y="12530765"/>
-            <a:ext cx="7839800" cy="7839800"/>
+            <a:off x="31512187" y="12371601"/>
+            <a:ext cx="10211126" cy="7453788"/>
           </a:xfrm>
           <a:prstGeom prst="rect">
             <a:avLst/>
@@ -3820,8 +3823,8 @@
         </p:blipFill>
         <p:spPr>
           <a:xfrm>
-            <a:off x="29899189" y="5052730"/>
-            <a:ext cx="7211329" cy="7211329"/>
+            <a:off x="31443183" y="5496223"/>
+            <a:ext cx="10211126" cy="6089444"/>
           </a:xfrm>
           <a:prstGeom prst="rect">
             <a:avLst/>
@@ -3910,7 +3913,7 @@
         </p:blipFill>
         <p:spPr>
           <a:xfrm>
-            <a:off x="937849" y="19526723"/>
+            <a:off x="937849" y="21624458"/>
             <a:ext cx="13261226" cy="8002464"/>
           </a:xfrm>
           <a:prstGeom prst="rect">
@@ -3918,6 +3921,120 @@
           </a:prstGeom>
         </p:spPr>
       </p:pic>
+      <p:sp>
+        <p:nvSpPr>
+          <p:cNvPr id="8" name="TextBox 7">
+            <a:extLst>
+              <a:ext uri="{FF2B5EF4-FFF2-40B4-BE49-F238E27FC236}">
+                <a16:creationId xmlns:a16="http://schemas.microsoft.com/office/drawing/2014/main" id="{6BEAAFFC-C0A2-4278-80D5-83D66B983E6D}"/>
+              </a:ext>
+            </a:extLst>
+          </p:cNvPr>
+          <p:cNvSpPr txBox="1"/>
+          <p:nvPr/>
+        </p:nvSpPr>
+        <p:spPr>
+          <a:xfrm>
+            <a:off x="1099213" y="16182710"/>
+            <a:ext cx="12981262" cy="2400657"/>
+          </a:xfrm>
+          <a:prstGeom prst="rect">
+            <a:avLst/>
+          </a:prstGeom>
+          <a:noFill/>
+        </p:spPr>
+        <p:txBody>
+          <a:bodyPr wrap="square" rtlCol="0">
+            <a:spAutoFit/>
+          </a:bodyPr>
+          <a:lstStyle/>
+          <a:p>
+            <a:r>
+              <a:rPr lang="en-US" sz="5000" dirty="0"/>
+              <a:t>Determine the effect of hyperbaric treatment and concentrated oxygen on venous metabolites</a:t>
+            </a:r>
+          </a:p>
+        </p:txBody>
+      </p:sp>
+      <p:sp>
+        <p:nvSpPr>
+          <p:cNvPr id="12" name="TextBox 11">
+            <a:extLst>
+              <a:ext uri="{FF2B5EF4-FFF2-40B4-BE49-F238E27FC236}">
+                <a16:creationId xmlns:a16="http://schemas.microsoft.com/office/drawing/2014/main" id="{766AB7EA-E060-4771-A7E0-7241E19E1248}"/>
+              </a:ext>
+            </a:extLst>
+          </p:cNvPr>
+          <p:cNvSpPr txBox="1"/>
+          <p:nvPr/>
+        </p:nvSpPr>
+        <p:spPr>
+          <a:xfrm>
+            <a:off x="29899189" y="21818788"/>
+            <a:ext cx="13335356" cy="5632311"/>
+          </a:xfrm>
+          <a:prstGeom prst="rect">
+            <a:avLst/>
+          </a:prstGeom>
+          <a:noFill/>
+        </p:spPr>
+        <p:txBody>
+          <a:bodyPr wrap="square" rtlCol="0">
+            <a:spAutoFit/>
+          </a:bodyPr>
+          <a:lstStyle/>
+          <a:p>
+            <a:pPr marL="285750" indent="-285750">
+              <a:buFont typeface="Arial" panose="020B0604020202020204" pitchFamily="34" charset="0"/>
+              <a:buChar char="•"/>
+            </a:pPr>
+            <a:r>
+              <a:rPr lang="en-US" sz="4500" dirty="0"/>
+              <a:t>Greater increase in plasma potassium in hyperbaric treatment group than concentrated oxygen</a:t>
+            </a:r>
+          </a:p>
+          <a:p>
+            <a:pPr marL="285750" indent="-285750">
+              <a:buFont typeface="Arial" panose="020B0604020202020204" pitchFamily="34" charset="0"/>
+              <a:buChar char="•"/>
+            </a:pPr>
+            <a:r>
+              <a:rPr lang="en-US" sz="4500" dirty="0"/>
+              <a:t>Possible explanations </a:t>
+            </a:r>
+          </a:p>
+          <a:p>
+            <a:pPr marL="2480310" lvl="1" indent="-285750">
+              <a:buFont typeface="Arial" panose="020B0604020202020204" pitchFamily="34" charset="0"/>
+              <a:buChar char="•"/>
+            </a:pPr>
+            <a:r>
+              <a:rPr lang="en-US" sz="4500" dirty="0"/>
+              <a:t>Lack of dietary restriction</a:t>
+            </a:r>
+          </a:p>
+          <a:p>
+            <a:pPr marL="2480310" lvl="1" indent="-285750">
+              <a:buFont typeface="Arial" panose="020B0604020202020204" pitchFamily="34" charset="0"/>
+              <a:buChar char="•"/>
+            </a:pPr>
+            <a:r>
+              <a:rPr lang="en-US" sz="4500" dirty="0"/>
+              <a:t>Increased CO2/N2 in chamber</a:t>
+            </a:r>
+          </a:p>
+          <a:p>
+            <a:pPr marL="2480310" lvl="1" indent="-285750">
+              <a:buFont typeface="Arial" panose="020B0604020202020204" pitchFamily="34" charset="0"/>
+              <a:buChar char="•"/>
+            </a:pPr>
+            <a:r>
+              <a:rPr lang="en-US" sz="4500" dirty="0"/>
+              <a:t>Affects of increased pressure on vasoconstriction </a:t>
+            </a:r>
+          </a:p>
+        </p:txBody>
+      </p:sp>
     </p:spTree>
     <p:extLst>
       <p:ext uri="{BB962C8B-B14F-4D97-AF65-F5344CB8AC3E}">

</xml_diff>

<commit_message>
Completed draft of poster for practice presentation
</commit_message>
<xml_diff>
--- a/EB/EB2022Posterv1_Lamers.pptx
+++ b/EB/EB2022Posterv1_Lamers.pptx
@@ -238,7 +238,7 @@
           <a:p>
             <a:fld id="{BEBB2256-B637-B240-AA1D-93430E873738}" type="datetimeFigureOut">
               <a:rPr lang="en-US" smtClean="0"/>
-              <a:t>3/14/2022</a:t>
+              <a:t>3/17/2022</a:t>
             </a:fld>
             <a:endParaRPr lang="en-US"/>
           </a:p>
@@ -3066,7 +3066,7 @@
         </p:nvSpPr>
         <p:spPr bwMode="auto">
           <a:xfrm>
-            <a:off x="650271" y="14888694"/>
+            <a:off x="650271" y="14243238"/>
             <a:ext cx="13716000" cy="1181861"/>
           </a:xfrm>
           <a:prstGeom prst="rect">
@@ -3773,126 +3773,6 @@
       </p:sp>
       <p:pic>
         <p:nvPicPr>
-          <p:cNvPr id="16" name="Picture 15"/>
-          <p:cNvPicPr>
-            <a:picLocks noChangeAspect="1"/>
-          </p:cNvPicPr>
-          <p:nvPr/>
-        </p:nvPicPr>
-        <p:blipFill>
-          <a:blip r:embed="rId7">
-            <a:extLst>
-              <a:ext uri="{28A0092B-C50C-407E-A947-70E740481C1C}">
-                <a14:useLocalDpi xmlns:a14="http://schemas.microsoft.com/office/drawing/2010/main" val="0"/>
-              </a:ext>
-            </a:extLst>
-          </a:blip>
-          <a:stretch>
-            <a:fillRect/>
-          </a:stretch>
-        </p:blipFill>
-        <p:spPr>
-          <a:xfrm>
-            <a:off x="31512187" y="12371601"/>
-            <a:ext cx="10211126" cy="7453788"/>
-          </a:xfrm>
-          <a:prstGeom prst="rect">
-            <a:avLst/>
-          </a:prstGeom>
-        </p:spPr>
-      </p:pic>
-      <p:pic>
-        <p:nvPicPr>
-          <p:cNvPr id="45" name="Picture 44"/>
-          <p:cNvPicPr>
-            <a:picLocks noChangeAspect="1"/>
-          </p:cNvPicPr>
-          <p:nvPr/>
-        </p:nvPicPr>
-        <p:blipFill>
-          <a:blip r:embed="rId8">
-            <a:extLst>
-              <a:ext uri="{28A0092B-C50C-407E-A947-70E740481C1C}">
-                <a14:useLocalDpi xmlns:a14="http://schemas.microsoft.com/office/drawing/2010/main" val="0"/>
-              </a:ext>
-            </a:extLst>
-          </a:blip>
-          <a:stretch>
-            <a:fillRect/>
-          </a:stretch>
-        </p:blipFill>
-        <p:spPr>
-          <a:xfrm>
-            <a:off x="31443183" y="5496223"/>
-            <a:ext cx="10211126" cy="6089444"/>
-          </a:xfrm>
-          <a:prstGeom prst="rect">
-            <a:avLst/>
-          </a:prstGeom>
-        </p:spPr>
-      </p:pic>
-      <p:pic>
-        <p:nvPicPr>
-          <p:cNvPr id="2" name="Picture 1"/>
-          <p:cNvPicPr>
-            <a:picLocks noChangeAspect="1"/>
-          </p:cNvPicPr>
-          <p:nvPr/>
-        </p:nvPicPr>
-        <p:blipFill>
-          <a:blip r:embed="rId9">
-            <a:extLst>
-              <a:ext uri="{28A0092B-C50C-407E-A947-70E740481C1C}">
-                <a14:useLocalDpi xmlns:a14="http://schemas.microsoft.com/office/drawing/2010/main" val="0"/>
-              </a:ext>
-            </a:extLst>
-          </a:blip>
-          <a:stretch>
-            <a:fillRect/>
-          </a:stretch>
-        </p:blipFill>
-        <p:spPr>
-          <a:xfrm>
-            <a:off x="16204545" y="18225577"/>
-            <a:ext cx="12120123" cy="12120123"/>
-          </a:xfrm>
-          <a:prstGeom prst="rect">
-            <a:avLst/>
-          </a:prstGeom>
-        </p:spPr>
-      </p:pic>
-      <p:pic>
-        <p:nvPicPr>
-          <p:cNvPr id="6" name="Picture 5"/>
-          <p:cNvPicPr>
-            <a:picLocks noChangeAspect="1"/>
-          </p:cNvPicPr>
-          <p:nvPr/>
-        </p:nvPicPr>
-        <p:blipFill>
-          <a:blip r:embed="rId10">
-            <a:extLst>
-              <a:ext uri="{28A0092B-C50C-407E-A947-70E740481C1C}">
-                <a14:useLocalDpi xmlns:a14="http://schemas.microsoft.com/office/drawing/2010/main" val="0"/>
-              </a:ext>
-            </a:extLst>
-          </a:blip>
-          <a:stretch>
-            <a:fillRect/>
-          </a:stretch>
-        </p:blipFill>
-        <p:spPr>
-          <a:xfrm>
-            <a:off x="16204545" y="5591568"/>
-            <a:ext cx="11527826" cy="11527826"/>
-          </a:xfrm>
-          <a:prstGeom prst="rect">
-            <a:avLst/>
-          </a:prstGeom>
-        </p:spPr>
-      </p:pic>
-      <p:pic>
-        <p:nvPicPr>
           <p:cNvPr id="10" name="Picture 9" descr="Diagram&#10;&#10;Description automatically generated">
             <a:extLst>
               <a:ext uri="{FF2B5EF4-FFF2-40B4-BE49-F238E27FC236}">
@@ -3906,7 +3786,7 @@
           <p:nvPr/>
         </p:nvPicPr>
         <p:blipFill>
-          <a:blip r:embed="rId11"/>
+          <a:blip r:embed="rId7"/>
           <a:stretch>
             <a:fillRect/>
           </a:stretch>
@@ -3935,7 +3815,7 @@
         </p:nvSpPr>
         <p:spPr>
           <a:xfrm>
-            <a:off x="1099213" y="16182710"/>
+            <a:off x="1099213" y="15966828"/>
             <a:ext cx="12981262" cy="2400657"/>
           </a:xfrm>
           <a:prstGeom prst="rect">
@@ -4010,16 +3890,6 @@
             </a:pPr>
             <a:r>
               <a:rPr lang="en-US" sz="4500" dirty="0"/>
-              <a:t>Lack of dietary restriction</a:t>
-            </a:r>
-          </a:p>
-          <a:p>
-            <a:pPr marL="2480310" lvl="1" indent="-285750">
-              <a:buFont typeface="Arial" panose="020B0604020202020204" pitchFamily="34" charset="0"/>
-              <a:buChar char="•"/>
-            </a:pPr>
-            <a:r>
-              <a:rPr lang="en-US" sz="4500" dirty="0"/>
               <a:t>Increased CO2/N2 in chamber</a:t>
             </a:r>
           </a:p>
@@ -4033,8 +3903,223 @@
               <a:t>Affects of increased pressure on vasoconstriction </a:t>
             </a:r>
           </a:p>
+          <a:p>
+            <a:pPr marL="2480310" lvl="1" indent="-285750">
+              <a:buFont typeface="Arial" panose="020B0604020202020204" pitchFamily="34" charset="0"/>
+              <a:buChar char="•"/>
+            </a:pPr>
+            <a:r>
+              <a:rPr lang="en-US" sz="4500" dirty="0"/>
+              <a:t>Changes in expression of K+ channels</a:t>
+            </a:r>
+          </a:p>
         </p:txBody>
       </p:sp>
+      <p:sp>
+        <p:nvSpPr>
+          <p:cNvPr id="15" name="TextBox 14">
+            <a:extLst>
+              <a:ext uri="{FF2B5EF4-FFF2-40B4-BE49-F238E27FC236}">
+                <a16:creationId xmlns:a16="http://schemas.microsoft.com/office/drawing/2014/main" id="{249B9558-2E02-4DDD-8BBA-1BE176649971}"/>
+              </a:ext>
+            </a:extLst>
+          </p:cNvPr>
+          <p:cNvSpPr txBox="1"/>
+          <p:nvPr/>
+        </p:nvSpPr>
+        <p:spPr>
+          <a:xfrm>
+            <a:off x="937849" y="5169276"/>
+            <a:ext cx="13030200" cy="8556188"/>
+          </a:xfrm>
+          <a:prstGeom prst="rect">
+            <a:avLst/>
+          </a:prstGeom>
+          <a:noFill/>
+        </p:spPr>
+        <p:txBody>
+          <a:bodyPr wrap="square" rtlCol="0">
+            <a:spAutoFit/>
+          </a:bodyPr>
+          <a:lstStyle/>
+          <a:p>
+            <a:pPr marL="685800" indent="-685800">
+              <a:buFont typeface="Arial" panose="020B0604020202020204" pitchFamily="34" charset="0"/>
+              <a:buChar char="•"/>
+            </a:pPr>
+            <a:r>
+              <a:rPr lang="en-US" sz="5500" dirty="0"/>
+              <a:t>Changes in pressure and oxygen concentration can be used to modulate oxygen levels in humans</a:t>
+            </a:r>
+          </a:p>
+          <a:p>
+            <a:pPr marL="685800" indent="-685800">
+              <a:buFont typeface="Arial" panose="020B0604020202020204" pitchFamily="34" charset="0"/>
+              <a:buChar char="•"/>
+            </a:pPr>
+            <a:r>
+              <a:rPr lang="en-US" sz="5500" dirty="0"/>
+              <a:t>Hyperoxia has been linked to increases in plasma potassium </a:t>
+            </a:r>
+          </a:p>
+          <a:p>
+            <a:pPr marL="685800" indent="-685800">
+              <a:buFont typeface="Arial" panose="020B0604020202020204" pitchFamily="34" charset="0"/>
+              <a:buChar char="•"/>
+            </a:pPr>
+            <a:r>
+              <a:rPr lang="en-US" sz="5500" dirty="0"/>
+              <a:t>Effects of </a:t>
+            </a:r>
+            <a:r>
+              <a:rPr lang="en-US" sz="5500" dirty="0" err="1"/>
+              <a:t>hyperbaria</a:t>
+            </a:r>
+            <a:r>
+              <a:rPr lang="en-US" sz="5500" dirty="0"/>
+              <a:t> on plasma potassium levels remain understudied</a:t>
+            </a:r>
+          </a:p>
+          <a:p>
+            <a:pPr marL="685800" indent="-685800">
+              <a:buFont typeface="Arial" panose="020B0604020202020204" pitchFamily="34" charset="0"/>
+              <a:buChar char="•"/>
+            </a:pPr>
+            <a:r>
+              <a:rPr lang="en-US" sz="5500" dirty="0"/>
+              <a:t>Hypoxia has been linked to changes in plasma potassium levels via HIF-1</a:t>
+            </a:r>
+            <a:r>
+              <a:rPr lang="el-GR" sz="5500" dirty="0"/>
+              <a:t>α</a:t>
+            </a:r>
+            <a:r>
+              <a:rPr lang="en-US" sz="5500" dirty="0"/>
+              <a:t>  pathway</a:t>
+            </a:r>
+          </a:p>
+        </p:txBody>
+      </p:sp>
+      <p:pic>
+        <p:nvPicPr>
+          <p:cNvPr id="32" name="Picture 31">
+            <a:extLst>
+              <a:ext uri="{FF2B5EF4-FFF2-40B4-BE49-F238E27FC236}">
+                <a16:creationId xmlns:a16="http://schemas.microsoft.com/office/drawing/2014/main" id="{8B8AE941-0278-4952-B4DA-1BFD20CB987D}"/>
+              </a:ext>
+            </a:extLst>
+          </p:cNvPr>
+          <p:cNvPicPr>
+            <a:picLocks noChangeAspect="1"/>
+          </p:cNvPicPr>
+          <p:nvPr/>
+        </p:nvPicPr>
+        <p:blipFill>
+          <a:blip r:embed="rId8"/>
+          <a:stretch>
+            <a:fillRect/>
+          </a:stretch>
+        </p:blipFill>
+        <p:spPr>
+          <a:xfrm>
+            <a:off x="15740929" y="5332630"/>
+            <a:ext cx="12365498" cy="11770594"/>
+          </a:xfrm>
+          <a:prstGeom prst="rect">
+            <a:avLst/>
+          </a:prstGeom>
+        </p:spPr>
+      </p:pic>
+      <p:pic>
+        <p:nvPicPr>
+          <p:cNvPr id="37" name="Picture 36">
+            <a:extLst>
+              <a:ext uri="{FF2B5EF4-FFF2-40B4-BE49-F238E27FC236}">
+                <a16:creationId xmlns:a16="http://schemas.microsoft.com/office/drawing/2014/main" id="{A64E18B6-6521-49A7-8967-A523F97C23F8}"/>
+              </a:ext>
+            </a:extLst>
+          </p:cNvPr>
+          <p:cNvPicPr>
+            <a:picLocks noChangeAspect="1"/>
+          </p:cNvPicPr>
+          <p:nvPr/>
+        </p:nvPicPr>
+        <p:blipFill>
+          <a:blip r:embed="rId9"/>
+          <a:stretch>
+            <a:fillRect/>
+          </a:stretch>
+        </p:blipFill>
+        <p:spPr>
+          <a:xfrm>
+            <a:off x="16137511" y="17748290"/>
+            <a:ext cx="11802768" cy="12235486"/>
+          </a:xfrm>
+          <a:prstGeom prst="rect">
+            <a:avLst/>
+          </a:prstGeom>
+        </p:spPr>
+      </p:pic>
+      <p:pic>
+        <p:nvPicPr>
+          <p:cNvPr id="39" name="Picture 38">
+            <a:extLst>
+              <a:ext uri="{FF2B5EF4-FFF2-40B4-BE49-F238E27FC236}">
+                <a16:creationId xmlns:a16="http://schemas.microsoft.com/office/drawing/2014/main" id="{FC51F5AB-4DB7-43DB-889C-35288A9AE4AD}"/>
+              </a:ext>
+            </a:extLst>
+          </p:cNvPr>
+          <p:cNvPicPr>
+            <a:picLocks noChangeAspect="1"/>
+          </p:cNvPicPr>
+          <p:nvPr/>
+        </p:nvPicPr>
+        <p:blipFill>
+          <a:blip r:embed="rId10"/>
+          <a:stretch>
+            <a:fillRect/>
+          </a:stretch>
+        </p:blipFill>
+        <p:spPr>
+          <a:xfrm>
+            <a:off x="31950314" y="5170014"/>
+            <a:ext cx="9466627" cy="7200900"/>
+          </a:xfrm>
+          <a:prstGeom prst="rect">
+            <a:avLst/>
+          </a:prstGeom>
+        </p:spPr>
+      </p:pic>
+      <p:pic>
+        <p:nvPicPr>
+          <p:cNvPr id="41" name="Picture 40">
+            <a:extLst>
+              <a:ext uri="{FF2B5EF4-FFF2-40B4-BE49-F238E27FC236}">
+                <a16:creationId xmlns:a16="http://schemas.microsoft.com/office/drawing/2014/main" id="{E46795BB-9A12-4770-AC4D-ED407CCF9DBE}"/>
+              </a:ext>
+            </a:extLst>
+          </p:cNvPr>
+          <p:cNvPicPr>
+            <a:picLocks noChangeAspect="1"/>
+          </p:cNvPicPr>
+          <p:nvPr/>
+        </p:nvPicPr>
+        <p:blipFill>
+          <a:blip r:embed="rId11"/>
+          <a:stretch>
+            <a:fillRect/>
+          </a:stretch>
+        </p:blipFill>
+        <p:spPr>
+          <a:xfrm>
+            <a:off x="32004103" y="12932867"/>
+            <a:ext cx="9466627" cy="7038975"/>
+          </a:xfrm>
+          <a:prstGeom prst="rect">
+            <a:avLst/>
+          </a:prstGeom>
+        </p:spPr>
+      </p:pic>
     </p:spTree>
     <p:extLst>
       <p:ext uri="{BB962C8B-B14F-4D97-AF65-F5344CB8AC3E}">

</xml_diff>

<commit_message>
Final version of EB poster and figures
</commit_message>
<xml_diff>
--- a/EB/EB2022Posterv1_Lamers.pptx
+++ b/EB/EB2022Posterv1_Lamers.pptx
@@ -10,13 +10,13 @@
   <p:sldIdLst>
     <p:sldId id="256" r:id="rId2"/>
   </p:sldIdLst>
-  <p:sldSz cx="43891200" cy="32918400"/>
+  <p:sldSz cx="40233600" cy="30175200"/>
   <p:notesSz cx="7010400" cy="9296400"/>
   <p:defaultTextStyle>
     <a:defPPr>
       <a:defRPr lang="en-US"/>
     </a:defPPr>
-    <a:lvl1pPr algn="l" defTabSz="2194560" rtl="0" fontAlgn="base">
+    <a:lvl1pPr algn="l" defTabSz="2011534" rtl="0" fontAlgn="base">
       <a:spcBef>
         <a:spcPct val="0"/>
       </a:spcBef>
@@ -32,7 +32,7 @@
         <a:cs typeface="+mn-cs"/>
       </a:defRPr>
     </a:lvl1pPr>
-    <a:lvl2pPr marL="2194560" algn="l" defTabSz="2194560" rtl="0" fontAlgn="base">
+    <a:lvl2pPr marL="2011534" algn="l" defTabSz="2011534" rtl="0" fontAlgn="base">
       <a:spcBef>
         <a:spcPct val="0"/>
       </a:spcBef>
@@ -48,7 +48,7 @@
         <a:cs typeface="+mn-cs"/>
       </a:defRPr>
     </a:lvl2pPr>
-    <a:lvl3pPr marL="4389120" algn="l" defTabSz="2194560" rtl="0" fontAlgn="base">
+    <a:lvl3pPr marL="4023067" algn="l" defTabSz="2011534" rtl="0" fontAlgn="base">
       <a:spcBef>
         <a:spcPct val="0"/>
       </a:spcBef>
@@ -64,7 +64,7 @@
         <a:cs typeface="+mn-cs"/>
       </a:defRPr>
     </a:lvl3pPr>
-    <a:lvl4pPr marL="6583680" algn="l" defTabSz="2194560" rtl="0" fontAlgn="base">
+    <a:lvl4pPr marL="6034601" algn="l" defTabSz="2011534" rtl="0" fontAlgn="base">
       <a:spcBef>
         <a:spcPct val="0"/>
       </a:spcBef>
@@ -80,7 +80,7 @@
         <a:cs typeface="+mn-cs"/>
       </a:defRPr>
     </a:lvl4pPr>
-    <a:lvl5pPr marL="8778240" algn="l" defTabSz="2194560" rtl="0" fontAlgn="base">
+    <a:lvl5pPr marL="8046135" algn="l" defTabSz="2011534" rtl="0" fontAlgn="base">
       <a:spcBef>
         <a:spcPct val="0"/>
       </a:spcBef>
@@ -96,7 +96,7 @@
         <a:cs typeface="+mn-cs"/>
       </a:defRPr>
     </a:lvl5pPr>
-    <a:lvl6pPr marL="10972800" algn="l" defTabSz="4389120" rtl="0" eaLnBrk="1" latinLnBrk="0" hangingPunct="1">
+    <a:lvl6pPr marL="10057668" algn="l" defTabSz="4023067" rtl="0" eaLnBrk="1" latinLnBrk="0" hangingPunct="1">
       <a:defRPr kern="1200">
         <a:solidFill>
           <a:schemeClr val="tx1"/>
@@ -106,7 +106,7 @@
         <a:cs typeface="+mn-cs"/>
       </a:defRPr>
     </a:lvl6pPr>
-    <a:lvl7pPr marL="13167360" algn="l" defTabSz="4389120" rtl="0" eaLnBrk="1" latinLnBrk="0" hangingPunct="1">
+    <a:lvl7pPr marL="12069202" algn="l" defTabSz="4023067" rtl="0" eaLnBrk="1" latinLnBrk="0" hangingPunct="1">
       <a:defRPr kern="1200">
         <a:solidFill>
           <a:schemeClr val="tx1"/>
@@ -116,7 +116,7 @@
         <a:cs typeface="+mn-cs"/>
       </a:defRPr>
     </a:lvl7pPr>
-    <a:lvl8pPr marL="15361920" algn="l" defTabSz="4389120" rtl="0" eaLnBrk="1" latinLnBrk="0" hangingPunct="1">
+    <a:lvl8pPr marL="14080736" algn="l" defTabSz="4023067" rtl="0" eaLnBrk="1" latinLnBrk="0" hangingPunct="1">
       <a:defRPr kern="1200">
         <a:solidFill>
           <a:schemeClr val="tx1"/>
@@ -126,7 +126,7 @@
         <a:cs typeface="+mn-cs"/>
       </a:defRPr>
     </a:lvl8pPr>
-    <a:lvl9pPr marL="17556480" algn="l" defTabSz="4389120" rtl="0" eaLnBrk="1" latinLnBrk="0" hangingPunct="1">
+    <a:lvl9pPr marL="16092270" algn="l" defTabSz="4023067" rtl="0" eaLnBrk="1" latinLnBrk="0" hangingPunct="1">
       <a:defRPr kern="1200">
         <a:solidFill>
           <a:schemeClr val="tx1"/>
@@ -140,12 +140,12 @@
   <p:extLst>
     <p:ext uri="{EFAFB233-063F-42B5-8137-9DF3F51BA10A}">
       <p15:sldGuideLst xmlns:p15="http://schemas.microsoft.com/office/powerpoint/2012/main">
-        <p15:guide id="1" orient="horz" pos="2386">
+        <p15:guide id="1" orient="horz" pos="2187" userDrawn="1">
           <p15:clr>
             <a:srgbClr val="A4A3A4"/>
           </p15:clr>
         </p15:guide>
-        <p15:guide id="2" pos="13824">
+        <p15:guide id="2" pos="12672" userDrawn="1">
           <p15:clr>
             <a:srgbClr val="A4A3A4"/>
           </p15:clr>
@@ -238,7 +238,7 @@
           <a:p>
             <a:fld id="{BEBB2256-B637-B240-AA1D-93430E873738}" type="datetimeFigureOut">
               <a:rPr lang="en-US" smtClean="0"/>
-              <a:t>3/17/2022</a:t>
+              <a:t>3/24/2022</a:t>
             </a:fld>
             <a:endParaRPr lang="en-US"/>
           </a:p>
@@ -411,8 +411,8 @@
   </p:cSld>
   <p:clrMap bg1="lt1" tx1="dk1" bg2="lt2" tx2="dk2" accent1="accent1" accent2="accent2" accent3="accent3" accent4="accent4" accent5="accent5" accent6="accent6" hlink="hlink" folHlink="folHlink"/>
   <p:notesStyle>
-    <a:lvl1pPr marL="0" algn="l" defTabSz="914400" rtl="0" eaLnBrk="1" latinLnBrk="0" hangingPunct="1">
-      <a:defRPr sz="1200" kern="1200">
+    <a:lvl1pPr marL="0" algn="l" defTabSz="838139" rtl="0" eaLnBrk="1" latinLnBrk="0" hangingPunct="1">
+      <a:defRPr sz="1100" kern="1200">
         <a:solidFill>
           <a:schemeClr val="tx1"/>
         </a:solidFill>
@@ -421,8 +421,8 @@
         <a:cs typeface="+mn-cs"/>
       </a:defRPr>
     </a:lvl1pPr>
-    <a:lvl2pPr marL="457200" algn="l" defTabSz="914400" rtl="0" eaLnBrk="1" latinLnBrk="0" hangingPunct="1">
-      <a:defRPr sz="1200" kern="1200">
+    <a:lvl2pPr marL="419070" algn="l" defTabSz="838139" rtl="0" eaLnBrk="1" latinLnBrk="0" hangingPunct="1">
+      <a:defRPr sz="1100" kern="1200">
         <a:solidFill>
           <a:schemeClr val="tx1"/>
         </a:solidFill>
@@ -431,8 +431,8 @@
         <a:cs typeface="+mn-cs"/>
       </a:defRPr>
     </a:lvl2pPr>
-    <a:lvl3pPr marL="914400" algn="l" defTabSz="914400" rtl="0" eaLnBrk="1" latinLnBrk="0" hangingPunct="1">
-      <a:defRPr sz="1200" kern="1200">
+    <a:lvl3pPr marL="838139" algn="l" defTabSz="838139" rtl="0" eaLnBrk="1" latinLnBrk="0" hangingPunct="1">
+      <a:defRPr sz="1100" kern="1200">
         <a:solidFill>
           <a:schemeClr val="tx1"/>
         </a:solidFill>
@@ -441,8 +441,8 @@
         <a:cs typeface="+mn-cs"/>
       </a:defRPr>
     </a:lvl3pPr>
-    <a:lvl4pPr marL="1371600" algn="l" defTabSz="914400" rtl="0" eaLnBrk="1" latinLnBrk="0" hangingPunct="1">
-      <a:defRPr sz="1200" kern="1200">
+    <a:lvl4pPr marL="1257209" algn="l" defTabSz="838139" rtl="0" eaLnBrk="1" latinLnBrk="0" hangingPunct="1">
+      <a:defRPr sz="1100" kern="1200">
         <a:solidFill>
           <a:schemeClr val="tx1"/>
         </a:solidFill>
@@ -451,8 +451,8 @@
         <a:cs typeface="+mn-cs"/>
       </a:defRPr>
     </a:lvl4pPr>
-    <a:lvl5pPr marL="1828800" algn="l" defTabSz="914400" rtl="0" eaLnBrk="1" latinLnBrk="0" hangingPunct="1">
-      <a:defRPr sz="1200" kern="1200">
+    <a:lvl5pPr marL="1676278" algn="l" defTabSz="838139" rtl="0" eaLnBrk="1" latinLnBrk="0" hangingPunct="1">
+      <a:defRPr sz="1100" kern="1200">
         <a:solidFill>
           <a:schemeClr val="tx1"/>
         </a:solidFill>
@@ -461,8 +461,8 @@
         <a:cs typeface="+mn-cs"/>
       </a:defRPr>
     </a:lvl5pPr>
-    <a:lvl6pPr marL="2286000" algn="l" defTabSz="914400" rtl="0" eaLnBrk="1" latinLnBrk="0" hangingPunct="1">
-      <a:defRPr sz="1200" kern="1200">
+    <a:lvl6pPr marL="2095348" algn="l" defTabSz="838139" rtl="0" eaLnBrk="1" latinLnBrk="0" hangingPunct="1">
+      <a:defRPr sz="1100" kern="1200">
         <a:solidFill>
           <a:schemeClr val="tx1"/>
         </a:solidFill>
@@ -471,8 +471,8 @@
         <a:cs typeface="+mn-cs"/>
       </a:defRPr>
     </a:lvl6pPr>
-    <a:lvl7pPr marL="2743200" algn="l" defTabSz="914400" rtl="0" eaLnBrk="1" latinLnBrk="0" hangingPunct="1">
-      <a:defRPr sz="1200" kern="1200">
+    <a:lvl7pPr marL="2514417" algn="l" defTabSz="838139" rtl="0" eaLnBrk="1" latinLnBrk="0" hangingPunct="1">
+      <a:defRPr sz="1100" kern="1200">
         <a:solidFill>
           <a:schemeClr val="tx1"/>
         </a:solidFill>
@@ -481,8 +481,8 @@
         <a:cs typeface="+mn-cs"/>
       </a:defRPr>
     </a:lvl7pPr>
-    <a:lvl8pPr marL="3200400" algn="l" defTabSz="914400" rtl="0" eaLnBrk="1" latinLnBrk="0" hangingPunct="1">
-      <a:defRPr sz="1200" kern="1200">
+    <a:lvl8pPr marL="2933487" algn="l" defTabSz="838139" rtl="0" eaLnBrk="1" latinLnBrk="0" hangingPunct="1">
+      <a:defRPr sz="1100" kern="1200">
         <a:solidFill>
           <a:schemeClr val="tx1"/>
         </a:solidFill>
@@ -491,8 +491,8 @@
         <a:cs typeface="+mn-cs"/>
       </a:defRPr>
     </a:lvl8pPr>
-    <a:lvl9pPr marL="3657600" algn="l" defTabSz="914400" rtl="0" eaLnBrk="1" latinLnBrk="0" hangingPunct="1">
-      <a:defRPr sz="1200" kern="1200">
+    <a:lvl9pPr marL="3352556" algn="l" defTabSz="838139" rtl="0" eaLnBrk="1" latinLnBrk="0" hangingPunct="1">
+      <a:defRPr sz="1100" kern="1200">
         <a:solidFill>
           <a:schemeClr val="tx1"/>
         </a:solidFill>
@@ -618,8 +618,8 @@
         </p:nvSpPr>
         <p:spPr>
           <a:xfrm>
-            <a:off x="3292475" y="10226675"/>
-            <a:ext cx="37306250" cy="7054850"/>
+            <a:off x="3018102" y="9374452"/>
+            <a:ext cx="34197396" cy="6466946"/>
           </a:xfrm>
           <a:prstGeom prst="rect">
             <a:avLst/>
@@ -648,8 +648,8 @@
         </p:nvSpPr>
         <p:spPr>
           <a:xfrm>
-            <a:off x="6583363" y="18653125"/>
-            <a:ext cx="30724475" cy="8413750"/>
+            <a:off x="6034750" y="17098698"/>
+            <a:ext cx="28164102" cy="7712604"/>
           </a:xfrm>
           <a:prstGeom prst="rect">
             <a:avLst/>
@@ -668,7 +668,7 @@
                 </a:solidFill>
               </a:defRPr>
             </a:lvl1pPr>
-            <a:lvl2pPr marL="457200" indent="0" algn="ctr">
+            <a:lvl2pPr marL="419115" indent="0" algn="ctr">
               <a:buNone/>
               <a:defRPr>
                 <a:solidFill>
@@ -678,7 +678,7 @@
                 </a:solidFill>
               </a:defRPr>
             </a:lvl2pPr>
-            <a:lvl3pPr marL="914400" indent="0" algn="ctr">
+            <a:lvl3pPr marL="838230" indent="0" algn="ctr">
               <a:buNone/>
               <a:defRPr>
                 <a:solidFill>
@@ -688,7 +688,7 @@
                 </a:solidFill>
               </a:defRPr>
             </a:lvl3pPr>
-            <a:lvl4pPr marL="1371600" indent="0" algn="ctr">
+            <a:lvl4pPr marL="1257346" indent="0" algn="ctr">
               <a:buNone/>
               <a:defRPr>
                 <a:solidFill>
@@ -698,7 +698,7 @@
                 </a:solidFill>
               </a:defRPr>
             </a:lvl4pPr>
-            <a:lvl5pPr marL="1828800" indent="0" algn="ctr">
+            <a:lvl5pPr marL="1676461" indent="0" algn="ctr">
               <a:buNone/>
               <a:defRPr>
                 <a:solidFill>
@@ -708,7 +708,7 @@
                 </a:solidFill>
               </a:defRPr>
             </a:lvl5pPr>
-            <a:lvl6pPr marL="2286000" indent="0" algn="ctr">
+            <a:lvl6pPr marL="2095576" indent="0" algn="ctr">
               <a:buNone/>
               <a:defRPr>
                 <a:solidFill>
@@ -718,7 +718,7 @@
                 </a:solidFill>
               </a:defRPr>
             </a:lvl6pPr>
-            <a:lvl7pPr marL="2743200" indent="0" algn="ctr">
+            <a:lvl7pPr marL="2514691" indent="0" algn="ctr">
               <a:buNone/>
               <a:defRPr>
                 <a:solidFill>
@@ -728,7 +728,7 @@
                 </a:solidFill>
               </a:defRPr>
             </a:lvl7pPr>
-            <a:lvl8pPr marL="3200400" indent="0" algn="ctr">
+            <a:lvl8pPr marL="2933807" indent="0" algn="ctr">
               <a:buNone/>
               <a:defRPr>
                 <a:solidFill>
@@ -738,7 +738,7 @@
                 </a:solidFill>
               </a:defRPr>
             </a:lvl8pPr>
-            <a:lvl9pPr marL="3657600" indent="0" algn="ctr">
+            <a:lvl9pPr marL="3352922" indent="0" algn="ctr">
               <a:buNone/>
               <a:defRPr>
                 <a:solidFill>
@@ -805,14 +805,14 @@
   </p:sldLayoutIdLst>
   <p:txStyles>
     <p:titleStyle>
-      <a:lvl1pPr algn="ctr" defTabSz="2194560" rtl="0" eaLnBrk="0" fontAlgn="base" hangingPunct="0">
+      <a:lvl1pPr algn="ctr" defTabSz="2011753" rtl="0" eaLnBrk="0" fontAlgn="base" hangingPunct="0">
         <a:spcBef>
           <a:spcPct val="0"/>
         </a:spcBef>
         <a:spcAft>
           <a:spcPct val="0"/>
         </a:spcAft>
-        <a:defRPr sz="21100" kern="1200">
+        <a:defRPr sz="19342" kern="1200">
           <a:solidFill>
             <a:schemeClr val="tx1"/>
           </a:solidFill>
@@ -821,14 +821,14 @@
           <a:cs typeface="ＭＳ Ｐゴシック" pitchFamily="1" charset="-128"/>
         </a:defRPr>
       </a:lvl1pPr>
-      <a:lvl2pPr algn="ctr" defTabSz="2194560" rtl="0" eaLnBrk="0" fontAlgn="base" hangingPunct="0">
+      <a:lvl2pPr algn="ctr" defTabSz="2011753" rtl="0" eaLnBrk="0" fontAlgn="base" hangingPunct="0">
         <a:spcBef>
           <a:spcPct val="0"/>
         </a:spcBef>
         <a:spcAft>
           <a:spcPct val="0"/>
         </a:spcAft>
-        <a:defRPr sz="21100">
+        <a:defRPr sz="19342">
           <a:solidFill>
             <a:schemeClr val="tx1"/>
           </a:solidFill>
@@ -837,14 +837,14 @@
           <a:cs typeface="ＭＳ Ｐゴシック" pitchFamily="1" charset="-128"/>
         </a:defRPr>
       </a:lvl2pPr>
-      <a:lvl3pPr algn="ctr" defTabSz="2194560" rtl="0" eaLnBrk="0" fontAlgn="base" hangingPunct="0">
+      <a:lvl3pPr algn="ctr" defTabSz="2011753" rtl="0" eaLnBrk="0" fontAlgn="base" hangingPunct="0">
         <a:spcBef>
           <a:spcPct val="0"/>
         </a:spcBef>
         <a:spcAft>
           <a:spcPct val="0"/>
         </a:spcAft>
-        <a:defRPr sz="21100">
+        <a:defRPr sz="19342">
           <a:solidFill>
             <a:schemeClr val="tx1"/>
           </a:solidFill>
@@ -853,14 +853,14 @@
           <a:cs typeface="ＭＳ Ｐゴシック" pitchFamily="1" charset="-128"/>
         </a:defRPr>
       </a:lvl3pPr>
-      <a:lvl4pPr algn="ctr" defTabSz="2194560" rtl="0" eaLnBrk="0" fontAlgn="base" hangingPunct="0">
+      <a:lvl4pPr algn="ctr" defTabSz="2011753" rtl="0" eaLnBrk="0" fontAlgn="base" hangingPunct="0">
         <a:spcBef>
           <a:spcPct val="0"/>
         </a:spcBef>
         <a:spcAft>
           <a:spcPct val="0"/>
         </a:spcAft>
-        <a:defRPr sz="21100">
+        <a:defRPr sz="19342">
           <a:solidFill>
             <a:schemeClr val="tx1"/>
           </a:solidFill>
@@ -869,14 +869,14 @@
           <a:cs typeface="ＭＳ Ｐゴシック" pitchFamily="1" charset="-128"/>
         </a:defRPr>
       </a:lvl4pPr>
-      <a:lvl5pPr algn="ctr" defTabSz="2194560" rtl="0" eaLnBrk="0" fontAlgn="base" hangingPunct="0">
+      <a:lvl5pPr algn="ctr" defTabSz="2011753" rtl="0" eaLnBrk="0" fontAlgn="base" hangingPunct="0">
         <a:spcBef>
           <a:spcPct val="0"/>
         </a:spcBef>
         <a:spcAft>
           <a:spcPct val="0"/>
         </a:spcAft>
-        <a:defRPr sz="21100">
+        <a:defRPr sz="19342">
           <a:solidFill>
             <a:schemeClr val="tx1"/>
           </a:solidFill>
@@ -885,14 +885,14 @@
           <a:cs typeface="ＭＳ Ｐゴシック" pitchFamily="1" charset="-128"/>
         </a:defRPr>
       </a:lvl5pPr>
-      <a:lvl6pPr marL="2194560" algn="ctr" defTabSz="2194560" rtl="0" fontAlgn="base">
+      <a:lvl6pPr marL="2011753" algn="ctr" defTabSz="2011753" rtl="0" fontAlgn="base">
         <a:spcBef>
           <a:spcPct val="0"/>
         </a:spcBef>
         <a:spcAft>
           <a:spcPct val="0"/>
         </a:spcAft>
-        <a:defRPr sz="21100">
+        <a:defRPr sz="19342">
           <a:solidFill>
             <a:schemeClr val="tx1"/>
           </a:solidFill>
@@ -901,14 +901,14 @@
           <a:cs typeface="ＭＳ Ｐゴシック" pitchFamily="1" charset="-128"/>
         </a:defRPr>
       </a:lvl6pPr>
-      <a:lvl7pPr marL="4389120" algn="ctr" defTabSz="2194560" rtl="0" fontAlgn="base">
+      <a:lvl7pPr marL="4023506" algn="ctr" defTabSz="2011753" rtl="0" fontAlgn="base">
         <a:spcBef>
           <a:spcPct val="0"/>
         </a:spcBef>
         <a:spcAft>
           <a:spcPct val="0"/>
         </a:spcAft>
-        <a:defRPr sz="21100">
+        <a:defRPr sz="19342">
           <a:solidFill>
             <a:schemeClr val="tx1"/>
           </a:solidFill>
@@ -917,14 +917,14 @@
           <a:cs typeface="ＭＳ Ｐゴシック" pitchFamily="1" charset="-128"/>
         </a:defRPr>
       </a:lvl7pPr>
-      <a:lvl8pPr marL="6583680" algn="ctr" defTabSz="2194560" rtl="0" fontAlgn="base">
+      <a:lvl8pPr marL="6035259" algn="ctr" defTabSz="2011753" rtl="0" fontAlgn="base">
         <a:spcBef>
           <a:spcPct val="0"/>
         </a:spcBef>
         <a:spcAft>
           <a:spcPct val="0"/>
         </a:spcAft>
-        <a:defRPr sz="21100">
+        <a:defRPr sz="19342">
           <a:solidFill>
             <a:schemeClr val="tx1"/>
           </a:solidFill>
@@ -933,14 +933,14 @@
           <a:cs typeface="ＭＳ Ｐゴシック" pitchFamily="1" charset="-128"/>
         </a:defRPr>
       </a:lvl8pPr>
-      <a:lvl9pPr marL="8778240" algn="ctr" defTabSz="2194560" rtl="0" fontAlgn="base">
+      <a:lvl9pPr marL="8047013" algn="ctr" defTabSz="2011753" rtl="0" fontAlgn="base">
         <a:spcBef>
           <a:spcPct val="0"/>
         </a:spcBef>
         <a:spcAft>
           <a:spcPct val="0"/>
         </a:spcAft>
-        <a:defRPr sz="21100">
+        <a:defRPr sz="19342">
           <a:solidFill>
             <a:schemeClr val="tx1"/>
           </a:solidFill>
@@ -951,7 +951,7 @@
       </a:lvl9pPr>
     </p:titleStyle>
     <p:bodyStyle>
-      <a:lvl1pPr marL="1645920" indent="-1645920" algn="l" defTabSz="2194560" rtl="0" eaLnBrk="0" fontAlgn="base" hangingPunct="0">
+      <a:lvl1pPr marL="1508815" indent="-1508815" algn="l" defTabSz="2011753" rtl="0" eaLnBrk="0" fontAlgn="base" hangingPunct="0">
         <a:spcBef>
           <a:spcPct val="20000"/>
         </a:spcBef>
@@ -960,7 +960,7 @@
         </a:spcAft>
         <a:buFont typeface="Arial" pitchFamily="34" charset="0"/>
         <a:buChar char="•"/>
-        <a:defRPr sz="15400" kern="1200">
+        <a:defRPr sz="14117" kern="1200">
           <a:solidFill>
             <a:schemeClr val="tx1"/>
           </a:solidFill>
@@ -969,7 +969,7 @@
           <a:cs typeface="ＭＳ Ｐゴシック" pitchFamily="1" charset="-128"/>
         </a:defRPr>
       </a:lvl1pPr>
-      <a:lvl2pPr marL="3566160" indent="-1371600" algn="l" defTabSz="2194560" rtl="0" eaLnBrk="0" fontAlgn="base" hangingPunct="0">
+      <a:lvl2pPr marL="3269099" indent="-1257346" algn="l" defTabSz="2011753" rtl="0" eaLnBrk="0" fontAlgn="base" hangingPunct="0">
         <a:spcBef>
           <a:spcPct val="20000"/>
         </a:spcBef>
@@ -978,7 +978,7 @@
         </a:spcAft>
         <a:buFont typeface="Arial" pitchFamily="34" charset="0"/>
         <a:buChar char="–"/>
-        <a:defRPr sz="13400" kern="1200">
+        <a:defRPr sz="12284" kern="1200">
           <a:solidFill>
             <a:schemeClr val="tx1"/>
           </a:solidFill>
@@ -987,7 +987,7 @@
           <a:cs typeface="+mn-cs"/>
         </a:defRPr>
       </a:lvl2pPr>
-      <a:lvl3pPr marL="5486400" indent="-1097280" algn="l" defTabSz="2194560" rtl="0" eaLnBrk="0" fontAlgn="base" hangingPunct="0">
+      <a:lvl3pPr marL="5029383" indent="-1005877" algn="l" defTabSz="2011753" rtl="0" eaLnBrk="0" fontAlgn="base" hangingPunct="0">
         <a:spcBef>
           <a:spcPct val="20000"/>
         </a:spcBef>
@@ -996,7 +996,7 @@
         </a:spcAft>
         <a:buFont typeface="Arial" pitchFamily="34" charset="0"/>
         <a:buChar char="•"/>
-        <a:defRPr sz="11500" kern="1200">
+        <a:defRPr sz="10542" kern="1200">
           <a:solidFill>
             <a:schemeClr val="tx1"/>
           </a:solidFill>
@@ -1005,7 +1005,7 @@
           <a:cs typeface="+mn-cs"/>
         </a:defRPr>
       </a:lvl3pPr>
-      <a:lvl4pPr marL="7680960" indent="-1097280" algn="l" defTabSz="2194560" rtl="0" eaLnBrk="0" fontAlgn="base" hangingPunct="0">
+      <a:lvl4pPr marL="7041136" indent="-1005877" algn="l" defTabSz="2011753" rtl="0" eaLnBrk="0" fontAlgn="base" hangingPunct="0">
         <a:spcBef>
           <a:spcPct val="20000"/>
         </a:spcBef>
@@ -1014,7 +1014,7 @@
         </a:spcAft>
         <a:buFont typeface="Arial" pitchFamily="34" charset="0"/>
         <a:buChar char="–"/>
-        <a:defRPr sz="9600" kern="1200">
+        <a:defRPr sz="8800" kern="1200">
           <a:solidFill>
             <a:schemeClr val="tx1"/>
           </a:solidFill>
@@ -1023,7 +1023,7 @@
           <a:cs typeface="+mn-cs"/>
         </a:defRPr>
       </a:lvl4pPr>
-      <a:lvl5pPr marL="9875520" indent="-1097280" algn="l" defTabSz="2194560" rtl="0" eaLnBrk="0" fontAlgn="base" hangingPunct="0">
+      <a:lvl5pPr marL="9052889" indent="-1005877" algn="l" defTabSz="2011753" rtl="0" eaLnBrk="0" fontAlgn="base" hangingPunct="0">
         <a:spcBef>
           <a:spcPct val="20000"/>
         </a:spcBef>
@@ -1032,7 +1032,7 @@
         </a:spcAft>
         <a:buFont typeface="Arial" pitchFamily="34" charset="0"/>
         <a:buChar char="»"/>
-        <a:defRPr sz="9600" kern="1200">
+        <a:defRPr sz="8800" kern="1200">
           <a:solidFill>
             <a:schemeClr val="tx1"/>
           </a:solidFill>
@@ -1041,13 +1041,13 @@
           <a:cs typeface="+mn-cs"/>
         </a:defRPr>
       </a:lvl5pPr>
-      <a:lvl6pPr marL="12070080" indent="-1097280" algn="l" defTabSz="2194560" rtl="0" eaLnBrk="1" latinLnBrk="0" hangingPunct="1">
+      <a:lvl6pPr marL="11064642" indent="-1005877" algn="l" defTabSz="2011753" rtl="0" eaLnBrk="1" latinLnBrk="0" hangingPunct="1">
         <a:spcBef>
           <a:spcPct val="20000"/>
         </a:spcBef>
         <a:buFont typeface="Arial"/>
         <a:buChar char="•"/>
-        <a:defRPr sz="9600" kern="1200">
+        <a:defRPr sz="8800" kern="1200">
           <a:solidFill>
             <a:schemeClr val="tx1"/>
           </a:solidFill>
@@ -1056,13 +1056,13 @@
           <a:cs typeface="+mn-cs"/>
         </a:defRPr>
       </a:lvl6pPr>
-      <a:lvl7pPr marL="14264640" indent="-1097280" algn="l" defTabSz="2194560" rtl="0" eaLnBrk="1" latinLnBrk="0" hangingPunct="1">
+      <a:lvl7pPr marL="13076395" indent="-1005877" algn="l" defTabSz="2011753" rtl="0" eaLnBrk="1" latinLnBrk="0" hangingPunct="1">
         <a:spcBef>
           <a:spcPct val="20000"/>
         </a:spcBef>
         <a:buFont typeface="Arial"/>
         <a:buChar char="•"/>
-        <a:defRPr sz="9600" kern="1200">
+        <a:defRPr sz="8800" kern="1200">
           <a:solidFill>
             <a:schemeClr val="tx1"/>
           </a:solidFill>
@@ -1071,13 +1071,13 @@
           <a:cs typeface="+mn-cs"/>
         </a:defRPr>
       </a:lvl7pPr>
-      <a:lvl8pPr marL="16459200" indent="-1097280" algn="l" defTabSz="2194560" rtl="0" eaLnBrk="1" latinLnBrk="0" hangingPunct="1">
+      <a:lvl8pPr marL="15088149" indent="-1005877" algn="l" defTabSz="2011753" rtl="0" eaLnBrk="1" latinLnBrk="0" hangingPunct="1">
         <a:spcBef>
           <a:spcPct val="20000"/>
         </a:spcBef>
         <a:buFont typeface="Arial"/>
         <a:buChar char="•"/>
-        <a:defRPr sz="9600" kern="1200">
+        <a:defRPr sz="8800" kern="1200">
           <a:solidFill>
             <a:schemeClr val="tx1"/>
           </a:solidFill>
@@ -1086,13 +1086,13 @@
           <a:cs typeface="+mn-cs"/>
         </a:defRPr>
       </a:lvl8pPr>
-      <a:lvl9pPr marL="18653760" indent="-1097280" algn="l" defTabSz="2194560" rtl="0" eaLnBrk="1" latinLnBrk="0" hangingPunct="1">
+      <a:lvl9pPr marL="17099902" indent="-1005877" algn="l" defTabSz="2011753" rtl="0" eaLnBrk="1" latinLnBrk="0" hangingPunct="1">
         <a:spcBef>
           <a:spcPct val="20000"/>
         </a:spcBef>
         <a:buFont typeface="Arial"/>
         <a:buChar char="•"/>
-        <a:defRPr sz="9600" kern="1200">
+        <a:defRPr sz="8800" kern="1200">
           <a:solidFill>
             <a:schemeClr val="tx1"/>
           </a:solidFill>
@@ -1106,8 +1106,8 @@
       <a:defPPr>
         <a:defRPr lang="en-US"/>
       </a:defPPr>
-      <a:lvl1pPr marL="0" algn="l" defTabSz="2194560" rtl="0" eaLnBrk="1" latinLnBrk="0" hangingPunct="1">
-        <a:defRPr sz="8600" kern="1200">
+      <a:lvl1pPr marL="0" algn="l" defTabSz="2011753" rtl="0" eaLnBrk="1" latinLnBrk="0" hangingPunct="1">
+        <a:defRPr sz="7884" kern="1200">
           <a:solidFill>
             <a:schemeClr val="tx1"/>
           </a:solidFill>
@@ -1116,8 +1116,8 @@
           <a:cs typeface="+mn-cs"/>
         </a:defRPr>
       </a:lvl1pPr>
-      <a:lvl2pPr marL="2194560" algn="l" defTabSz="2194560" rtl="0" eaLnBrk="1" latinLnBrk="0" hangingPunct="1">
-        <a:defRPr sz="8600" kern="1200">
+      <a:lvl2pPr marL="2011753" algn="l" defTabSz="2011753" rtl="0" eaLnBrk="1" latinLnBrk="0" hangingPunct="1">
+        <a:defRPr sz="7884" kern="1200">
           <a:solidFill>
             <a:schemeClr val="tx1"/>
           </a:solidFill>
@@ -1126,8 +1126,8 @@
           <a:cs typeface="+mn-cs"/>
         </a:defRPr>
       </a:lvl2pPr>
-      <a:lvl3pPr marL="4389120" algn="l" defTabSz="2194560" rtl="0" eaLnBrk="1" latinLnBrk="0" hangingPunct="1">
-        <a:defRPr sz="8600" kern="1200">
+      <a:lvl3pPr marL="4023506" algn="l" defTabSz="2011753" rtl="0" eaLnBrk="1" latinLnBrk="0" hangingPunct="1">
+        <a:defRPr sz="7884" kern="1200">
           <a:solidFill>
             <a:schemeClr val="tx1"/>
           </a:solidFill>
@@ -1136,8 +1136,8 @@
           <a:cs typeface="+mn-cs"/>
         </a:defRPr>
       </a:lvl3pPr>
-      <a:lvl4pPr marL="6583680" algn="l" defTabSz="2194560" rtl="0" eaLnBrk="1" latinLnBrk="0" hangingPunct="1">
-        <a:defRPr sz="8600" kern="1200">
+      <a:lvl4pPr marL="6035259" algn="l" defTabSz="2011753" rtl="0" eaLnBrk="1" latinLnBrk="0" hangingPunct="1">
+        <a:defRPr sz="7884" kern="1200">
           <a:solidFill>
             <a:schemeClr val="tx1"/>
           </a:solidFill>
@@ -1146,8 +1146,8 @@
           <a:cs typeface="+mn-cs"/>
         </a:defRPr>
       </a:lvl4pPr>
-      <a:lvl5pPr marL="8778240" algn="l" defTabSz="2194560" rtl="0" eaLnBrk="1" latinLnBrk="0" hangingPunct="1">
-        <a:defRPr sz="8600" kern="1200">
+      <a:lvl5pPr marL="8047013" algn="l" defTabSz="2011753" rtl="0" eaLnBrk="1" latinLnBrk="0" hangingPunct="1">
+        <a:defRPr sz="7884" kern="1200">
           <a:solidFill>
             <a:schemeClr val="tx1"/>
           </a:solidFill>
@@ -1156,8 +1156,8 @@
           <a:cs typeface="+mn-cs"/>
         </a:defRPr>
       </a:lvl5pPr>
-      <a:lvl6pPr marL="10972800" algn="l" defTabSz="2194560" rtl="0" eaLnBrk="1" latinLnBrk="0" hangingPunct="1">
-        <a:defRPr sz="8600" kern="1200">
+      <a:lvl6pPr marL="10058766" algn="l" defTabSz="2011753" rtl="0" eaLnBrk="1" latinLnBrk="0" hangingPunct="1">
+        <a:defRPr sz="7884" kern="1200">
           <a:solidFill>
             <a:schemeClr val="tx1"/>
           </a:solidFill>
@@ -1166,8 +1166,8 @@
           <a:cs typeface="+mn-cs"/>
         </a:defRPr>
       </a:lvl6pPr>
-      <a:lvl7pPr marL="13167360" algn="l" defTabSz="2194560" rtl="0" eaLnBrk="1" latinLnBrk="0" hangingPunct="1">
-        <a:defRPr sz="8600" kern="1200">
+      <a:lvl7pPr marL="12070519" algn="l" defTabSz="2011753" rtl="0" eaLnBrk="1" latinLnBrk="0" hangingPunct="1">
+        <a:defRPr sz="7884" kern="1200">
           <a:solidFill>
             <a:schemeClr val="tx1"/>
           </a:solidFill>
@@ -1176,8 +1176,8 @@
           <a:cs typeface="+mn-cs"/>
         </a:defRPr>
       </a:lvl7pPr>
-      <a:lvl8pPr marL="15361920" algn="l" defTabSz="2194560" rtl="0" eaLnBrk="1" latinLnBrk="0" hangingPunct="1">
-        <a:defRPr sz="8600" kern="1200">
+      <a:lvl8pPr marL="14082272" algn="l" defTabSz="2011753" rtl="0" eaLnBrk="1" latinLnBrk="0" hangingPunct="1">
+        <a:defRPr sz="7884" kern="1200">
           <a:solidFill>
             <a:schemeClr val="tx1"/>
           </a:solidFill>
@@ -1186,8 +1186,8 @@
           <a:cs typeface="+mn-cs"/>
         </a:defRPr>
       </a:lvl8pPr>
-      <a:lvl9pPr marL="17556480" algn="l" defTabSz="2194560" rtl="0" eaLnBrk="1" latinLnBrk="0" hangingPunct="1">
-        <a:defRPr sz="8600" kern="1200">
+      <a:lvl9pPr marL="16094025" algn="l" defTabSz="2011753" rtl="0" eaLnBrk="1" latinLnBrk="0" hangingPunct="1">
+        <a:defRPr sz="7884" kern="1200">
           <a:solidFill>
             <a:schemeClr val="tx1"/>
           </a:solidFill>
@@ -1226,8 +1226,8 @@
         </p:nvSpPr>
         <p:spPr>
           <a:xfrm>
-            <a:off x="15104074" y="3657604"/>
-            <a:ext cx="13716000" cy="27432000"/>
+            <a:off x="13845401" y="3352804"/>
+            <a:ext cx="12573000" cy="25146000"/>
           </a:xfrm>
           <a:prstGeom prst="rect">
             <a:avLst/>
@@ -1276,8 +1276,8 @@
         </p:nvSpPr>
         <p:spPr>
           <a:xfrm>
-            <a:off x="29557877" y="3657604"/>
-            <a:ext cx="13716000" cy="27432000"/>
+            <a:off x="27094721" y="3352804"/>
+            <a:ext cx="12573000" cy="25146000"/>
           </a:xfrm>
           <a:prstGeom prst="rect">
             <a:avLst/>
@@ -1313,7 +1313,7 @@
           <a:bodyPr rtlCol="0" anchor="ctr"/>
           <a:lstStyle/>
           <a:p>
-            <a:pPr marL="285750" indent="-285750" algn="ctr">
+            <a:pPr marL="261947" indent="-261947" algn="ctr">
               <a:buFont typeface="Arial" panose="020B0604020202020204" pitchFamily="34" charset="0"/>
               <a:buChar char="•"/>
             </a:pPr>
@@ -1329,8 +1329,8 @@
         </p:nvSpPr>
         <p:spPr>
           <a:xfrm>
-            <a:off x="656655" y="3673918"/>
-            <a:ext cx="13716000" cy="27432000"/>
+            <a:off x="601934" y="3367758"/>
+            <a:ext cx="12573000" cy="25146000"/>
           </a:xfrm>
           <a:prstGeom prst="rect">
             <a:avLst/>
@@ -1379,8 +1379,8 @@
         </p:nvSpPr>
         <p:spPr>
           <a:xfrm>
-            <a:off x="9144" y="9144"/>
-            <a:ext cx="43882056" cy="32909256"/>
+            <a:off x="8382" y="8382"/>
+            <a:ext cx="40225218" cy="30166818"/>
           </a:xfrm>
           <a:prstGeom prst="rect">
             <a:avLst/>
@@ -1427,7 +1427,7 @@
         <p:spPr>
           <a:xfrm>
             <a:off x="0" y="2"/>
-            <a:ext cx="43891200" cy="3063240"/>
+            <a:ext cx="40233600" cy="2807970"/>
           </a:xfrm>
           <a:prstGeom prst="rect">
             <a:avLst/>
@@ -1457,7 +1457,7 @@
           </a:fontRef>
         </p:style>
         <p:txBody>
-          <a:bodyPr lIns="438912" tIns="219456" rIns="438912" bIns="219456" anchor="ctr"/>
+          <a:bodyPr lIns="402336" tIns="201168" rIns="402336" bIns="201168" anchor="ctr"/>
           <a:lstStyle/>
           <a:p>
             <a:pPr algn="ctr" fontAlgn="auto">
@@ -1481,8 +1481,8 @@
         </p:nvSpPr>
         <p:spPr>
           <a:xfrm>
-            <a:off x="0" y="31649896"/>
-            <a:ext cx="43891200" cy="1295400"/>
+            <a:off x="0" y="29012405"/>
+            <a:ext cx="40233600" cy="1187450"/>
           </a:xfrm>
           <a:prstGeom prst="rect">
             <a:avLst/>
@@ -1512,10 +1512,10 @@
           </a:fontRef>
         </p:style>
         <p:txBody>
-          <a:bodyPr lIns="438912" tIns="219456" rIns="438912" bIns="219456" anchor="ctr"/>
+          <a:bodyPr lIns="402336" tIns="201168" rIns="402336" bIns="201168" anchor="ctr"/>
           <a:lstStyle/>
           <a:p>
-            <a:pPr lvl="0" algn="ctr" fontAlgn="auto">
+            <a:pPr algn="ctr" fontAlgn="auto">
               <a:spcBef>
                 <a:spcPts val="0"/>
               </a:spcBef>
@@ -1537,8 +1537,8 @@
         </p:nvSpPr>
         <p:spPr bwMode="auto">
           <a:xfrm>
-            <a:off x="0" y="3077640"/>
-            <a:ext cx="43891200" cy="220982"/>
+            <a:off x="0" y="2821170"/>
+            <a:ext cx="40233600" cy="202567"/>
           </a:xfrm>
           <a:prstGeom prst="rect">
             <a:avLst/>
@@ -1576,7 +1576,7 @@
           </a:effectLst>
         </p:spPr>
         <p:txBody>
-          <a:bodyPr lIns="438912" tIns="219456" rIns="438912" bIns="219456" anchor="ctr"/>
+          <a:bodyPr lIns="402336" tIns="201168" rIns="402336" bIns="201168" anchor="ctr"/>
           <a:lstStyle/>
           <a:p>
             <a:pPr algn="ctr" fontAlgn="auto">
@@ -1608,8 +1608,8 @@
         </p:nvSpPr>
         <p:spPr>
           <a:xfrm>
-            <a:off x="15446974" y="5215590"/>
-            <a:ext cx="13030200" cy="25603200"/>
+            <a:off x="14159726" y="4780958"/>
+            <a:ext cx="11944350" cy="23469600"/>
           </a:xfrm>
           <a:prstGeom prst="rect">
             <a:avLst/>
@@ -1773,7 +1773,7 @@
             <a:pPr marL="0" indent="0">
               <a:buNone/>
             </a:pPr>
-            <a:endParaRPr lang="en-US" dirty="0"/>
+            <a:endParaRPr lang="en-US" sz="2933" dirty="0"/>
           </a:p>
         </p:txBody>
       </p:sp>
@@ -1787,8 +1787,8 @@
         </p:nvSpPr>
         <p:spPr>
           <a:xfrm>
-            <a:off x="986787" y="5108406"/>
-            <a:ext cx="13030200" cy="5171466"/>
+            <a:off x="904555" y="4682705"/>
+            <a:ext cx="11944350" cy="4740511"/>
           </a:xfrm>
           <a:prstGeom prst="rect">
             <a:avLst/>
@@ -1952,7 +1952,7 @@
             <a:pPr marL="0" indent="0" algn="just">
               <a:buNone/>
             </a:pPr>
-            <a:endParaRPr lang="en-US" dirty="0"/>
+            <a:endParaRPr lang="en-US" sz="2933" dirty="0"/>
           </a:p>
         </p:txBody>
       </p:sp>
@@ -1966,8 +1966,8 @@
         </p:nvSpPr>
         <p:spPr>
           <a:xfrm>
-            <a:off x="986787" y="15391055"/>
-            <a:ext cx="13030200" cy="2468880"/>
+            <a:off x="904555" y="14108467"/>
+            <a:ext cx="11944350" cy="2263140"/>
           </a:xfrm>
           <a:prstGeom prst="rect">
             <a:avLst/>
@@ -2131,7 +2131,7 @@
             <a:pPr marL="0" indent="0">
               <a:buNone/>
             </a:pPr>
-            <a:endParaRPr lang="en-US" dirty="0"/>
+            <a:endParaRPr lang="en-US" sz="2933" dirty="0"/>
           </a:p>
         </p:txBody>
       </p:sp>
@@ -2145,8 +2145,8 @@
         </p:nvSpPr>
         <p:spPr>
           <a:xfrm>
-            <a:off x="29899189" y="21818788"/>
-            <a:ext cx="13030200" cy="5624106"/>
+            <a:off x="27407590" y="20000555"/>
+            <a:ext cx="11944350" cy="5155431"/>
           </a:xfrm>
           <a:prstGeom prst="rect">
             <a:avLst/>
@@ -2310,7 +2310,7 @@
             <a:pPr marL="0" indent="0" algn="just">
               <a:buNone/>
             </a:pPr>
-            <a:endParaRPr lang="en-US" dirty="0"/>
+            <a:endParaRPr lang="en-US" sz="2933" dirty="0"/>
           </a:p>
         </p:txBody>
       </p:sp>
@@ -2324,8 +2324,8 @@
         </p:nvSpPr>
         <p:spPr>
           <a:xfrm>
-            <a:off x="937849" y="19225142"/>
-            <a:ext cx="13030200" cy="8915400"/>
+            <a:off x="859695" y="17623047"/>
+            <a:ext cx="11944350" cy="8172450"/>
           </a:xfrm>
           <a:prstGeom prst="rect">
             <a:avLst/>
@@ -2489,7 +2489,7 @@
             <a:pPr marL="0" indent="0" algn="just">
               <a:buNone/>
             </a:pPr>
-            <a:endParaRPr lang="en-US" dirty="0"/>
+            <a:endParaRPr lang="en-US" sz="2933" dirty="0"/>
           </a:p>
         </p:txBody>
       </p:sp>
@@ -2501,8 +2501,8 @@
         </p:nvSpPr>
         <p:spPr>
           <a:xfrm>
-            <a:off x="29899189" y="28654084"/>
-            <a:ext cx="13030200" cy="2677656"/>
+            <a:off x="859695" y="26632383"/>
+            <a:ext cx="11944350" cy="2067554"/>
           </a:xfrm>
           <a:prstGeom prst="rect">
             <a:avLst/>
@@ -2516,24 +2516,16 @@
           <a:lstStyle/>
           <a:p>
             <a:r>
-              <a:rPr lang="en-US" sz="2800" dirty="0">
-                <a:cs typeface="Times New Roman" panose="02020603050405020304" pitchFamily="18" charset="0"/>
-              </a:rPr>
-              <a:t>Project supported by funding from the National Institutes of Health : RO1 HL086897 (MWE) and RO1 HL38149</a:t>
+              <a:rPr lang="en-US" sz="2567" dirty="0"/>
+              <a:t>Funding support from the University of Wisconsin – Madison, Department of Pediatrics, and Department of Medicine</a:t>
             </a:r>
-          </a:p>
-          <a:p>
-            <a:pPr>
-              <a:defRPr/>
-            </a:pPr>
-            <a:endParaRPr lang="en-US" sz="2800" dirty="0"/>
           </a:p>
           <a:p>
             <a:pPr>
               <a:defRPr/>
             </a:pPr>
             <a:r>
-              <a:rPr lang="en-US" sz="2800" b="1" dirty="0"/>
+              <a:rPr lang="en-US" sz="2567" b="1" dirty="0"/>
               <a:t>Jacob Lamers: jjlamers@wisc.edu</a:t>
             </a:r>
           </a:p>
@@ -2542,29 +2534,15 @@
               <a:defRPr/>
             </a:pPr>
             <a:r>
-              <a:rPr lang="en-US" sz="2800" b="1" dirty="0"/>
-              <a:t>Marlowe Eldridge, MD PhD: meldridge@pediatrics.wisc.edu</a:t>
+              <a:rPr lang="en-US" sz="2567" b="1" dirty="0"/>
+              <a:t>Marlowe Eldridge, MD: meldridge@pediatrics.wisc.edu</a:t>
             </a:r>
           </a:p>
           <a:p>
-            <a:pPr marL="0" marR="0" indent="0" algn="l" defTabSz="2194560" rtl="0" eaLnBrk="1" fontAlgn="base" latinLnBrk="0" hangingPunct="1">
-              <a:lnSpc>
-                <a:spcPct val="100000"/>
-              </a:lnSpc>
-              <a:spcBef>
-                <a:spcPct val="0"/>
-              </a:spcBef>
-              <a:spcAft>
-                <a:spcPct val="0"/>
-              </a:spcAft>
-              <a:buClrTx/>
-              <a:buSzTx/>
-              <a:buFontTx/>
-              <a:buNone/>
-              <a:tabLst/>
+            <a:pPr defTabSz="2011753">
               <a:defRPr/>
             </a:pPr>
-            <a:endParaRPr lang="en-US" sz="2800" dirty="0">
+            <a:endParaRPr lang="en-US" sz="2567" dirty="0">
               <a:latin typeface="+mj-lt"/>
               <a:ea typeface="Verdana" panose="020B0604030504040204" pitchFamily="34" charset="0"/>
               <a:cs typeface="Verdana" panose="020B0604030504040204" pitchFamily="34" charset="0"/>
@@ -2582,8 +2560,8 @@
         </p:nvSpPr>
         <p:spPr bwMode="auto">
           <a:xfrm>
-            <a:off x="643887" y="3657604"/>
-            <a:ext cx="13716000" cy="1181861"/>
+            <a:off x="590230" y="3352804"/>
+            <a:ext cx="12573000" cy="1083374"/>
           </a:xfrm>
           <a:prstGeom prst="rect">
             <a:avLst/>
@@ -2600,7 +2578,7 @@
           </a:ln>
         </p:spPr>
         <p:txBody>
-          <a:bodyPr wrap="square" lIns="438912" tIns="219456" rIns="438912" bIns="219456">
+          <a:bodyPr wrap="square" lIns="402336" tIns="201168" rIns="402336" bIns="201168">
             <a:spAutoFit/>
           </a:bodyPr>
           <a:lstStyle>
@@ -2713,7 +2691,7 @@
           <a:p>
             <a:pPr eaLnBrk="1" hangingPunct="1"/>
             <a:r>
-              <a:rPr lang="en-US" altLang="en-US" sz="4800" b="1" cap="none" spc="0" baseline="0" dirty="0">
+              <a:rPr lang="en-US" altLang="en-US" sz="4400" b="1" dirty="0">
                 <a:solidFill>
                   <a:schemeClr val="bg1"/>
                 </a:solidFill>
@@ -2742,8 +2720,8 @@
         </p:nvSpPr>
         <p:spPr bwMode="auto">
           <a:xfrm>
-            <a:off x="29557877" y="3657604"/>
-            <a:ext cx="13716000" cy="1181861"/>
+            <a:off x="27094721" y="3352804"/>
+            <a:ext cx="12573000" cy="1083374"/>
           </a:xfrm>
           <a:prstGeom prst="rect">
             <a:avLst/>
@@ -2760,7 +2738,7 @@
           </a:ln>
         </p:spPr>
         <p:txBody>
-          <a:bodyPr wrap="square" lIns="438912" tIns="219456" rIns="438912" bIns="219456">
+          <a:bodyPr wrap="square" lIns="402336" tIns="201168" rIns="402336" bIns="201168">
             <a:spAutoFit/>
           </a:bodyPr>
           <a:lstStyle>
@@ -2834,7 +2812,7 @@
           </a:lstStyle>
           <a:p>
             <a:r>
-              <a:rPr lang="en-US" altLang="en-US" dirty="0"/>
+              <a:rPr lang="en-US" altLang="en-US" sz="4400" dirty="0"/>
               <a:t>Results (cont.)</a:t>
             </a:r>
           </a:p>
@@ -2850,8 +2828,8 @@
         </p:nvSpPr>
         <p:spPr bwMode="auto">
           <a:xfrm>
-            <a:off x="29598386" y="20503747"/>
-            <a:ext cx="13716000" cy="1181861"/>
+            <a:off x="27131854" y="18795102"/>
+            <a:ext cx="12573000" cy="1083374"/>
           </a:xfrm>
           <a:prstGeom prst="rect">
             <a:avLst/>
@@ -2868,7 +2846,7 @@
           </a:ln>
         </p:spPr>
         <p:txBody>
-          <a:bodyPr wrap="square" lIns="438912" tIns="219456" rIns="438912" bIns="219456">
+          <a:bodyPr wrap="square" lIns="402336" tIns="201168" rIns="402336" bIns="201168">
             <a:spAutoFit/>
           </a:bodyPr>
           <a:lstStyle>
@@ -2942,7 +2920,7 @@
           </a:lstStyle>
           <a:p>
             <a:r>
-              <a:rPr lang="en-US" altLang="en-US" dirty="0"/>
+              <a:rPr lang="en-US" altLang="en-US" sz="4400" dirty="0"/>
               <a:t>Conclusions</a:t>
             </a:r>
           </a:p>
@@ -2958,8 +2936,8 @@
         </p:nvSpPr>
         <p:spPr bwMode="auto">
           <a:xfrm>
-            <a:off x="29598386" y="27339042"/>
-            <a:ext cx="13716000" cy="1181861"/>
+            <a:off x="610583" y="25540631"/>
+            <a:ext cx="12573000" cy="1083374"/>
           </a:xfrm>
           <a:prstGeom prst="rect">
             <a:avLst/>
@@ -2976,7 +2954,7 @@
           </a:ln>
         </p:spPr>
         <p:txBody>
-          <a:bodyPr wrap="square" lIns="438912" tIns="219456" rIns="438912" bIns="219456">
+          <a:bodyPr wrap="square" lIns="402336" tIns="201168" rIns="402336" bIns="201168">
             <a:spAutoFit/>
           </a:bodyPr>
           <a:lstStyle>
@@ -3050,7 +3028,7 @@
           </a:lstStyle>
           <a:p>
             <a:r>
-              <a:rPr lang="en-US" altLang="en-US" dirty="0"/>
+              <a:rPr lang="en-US" altLang="en-US" sz="4400" dirty="0"/>
               <a:t>Acknowledgements and Contact</a:t>
             </a:r>
           </a:p>
@@ -3066,8 +3044,8 @@
         </p:nvSpPr>
         <p:spPr bwMode="auto">
           <a:xfrm>
-            <a:off x="650271" y="14243238"/>
-            <a:ext cx="13716000" cy="1181861"/>
+            <a:off x="596082" y="13056302"/>
+            <a:ext cx="12573000" cy="1083374"/>
           </a:xfrm>
           <a:prstGeom prst="rect">
             <a:avLst/>
@@ -3084,7 +3062,7 @@
           </a:ln>
         </p:spPr>
         <p:txBody>
-          <a:bodyPr wrap="square" lIns="438912" tIns="219456" rIns="438912" bIns="219456">
+          <a:bodyPr wrap="square" lIns="402336" tIns="201168" rIns="402336" bIns="201168">
             <a:spAutoFit/>
           </a:bodyPr>
           <a:lstStyle>
@@ -3158,7 +3136,7 @@
           </a:lstStyle>
           <a:p>
             <a:r>
-              <a:rPr lang="en-US" altLang="en-US" dirty="0"/>
+              <a:rPr lang="en-US" altLang="en-US" sz="4400" dirty="0"/>
               <a:t>Objective</a:t>
             </a:r>
           </a:p>
@@ -3174,8 +3152,8 @@
         </p:nvSpPr>
         <p:spPr bwMode="auto">
           <a:xfrm>
-            <a:off x="663039" y="19012633"/>
-            <a:ext cx="13716000" cy="1181861"/>
+            <a:off x="607786" y="16643555"/>
+            <a:ext cx="12573000" cy="1083374"/>
           </a:xfrm>
           <a:prstGeom prst="rect">
             <a:avLst/>
@@ -3192,7 +3170,7 @@
           </a:ln>
         </p:spPr>
         <p:txBody>
-          <a:bodyPr wrap="square" lIns="438912" tIns="219456" rIns="438912" bIns="219456">
+          <a:bodyPr wrap="square" lIns="402336" tIns="201168" rIns="402336" bIns="201168">
             <a:spAutoFit/>
           </a:bodyPr>
           <a:lstStyle>
@@ -3266,7 +3244,7 @@
           </a:lstStyle>
           <a:p>
             <a:r>
-              <a:rPr lang="en-US" altLang="en-US" dirty="0"/>
+              <a:rPr lang="en-US" altLang="en-US" sz="4400" dirty="0"/>
               <a:t>Methods</a:t>
             </a:r>
           </a:p>
@@ -3282,8 +3260,8 @@
         </p:nvSpPr>
         <p:spPr bwMode="auto">
           <a:xfrm>
-            <a:off x="15110458" y="3657603"/>
-            <a:ext cx="13716000" cy="1181861"/>
+            <a:off x="13851253" y="3352803"/>
+            <a:ext cx="12573000" cy="1083374"/>
           </a:xfrm>
           <a:prstGeom prst="rect">
             <a:avLst/>
@@ -3300,7 +3278,7 @@
           </a:ln>
         </p:spPr>
         <p:txBody>
-          <a:bodyPr wrap="square" lIns="438912" tIns="219456" rIns="438912" bIns="219456">
+          <a:bodyPr wrap="square" lIns="402336" tIns="201168" rIns="402336" bIns="201168">
             <a:spAutoFit/>
           </a:bodyPr>
           <a:lstStyle>
@@ -3374,7 +3352,7 @@
           </a:lstStyle>
           <a:p>
             <a:r>
-              <a:rPr lang="en-US" altLang="en-US" dirty="0"/>
+              <a:rPr lang="en-US" altLang="en-US" sz="4400" dirty="0"/>
               <a:t>Results</a:t>
             </a:r>
           </a:p>
@@ -3388,8 +3366,8 @@
         </p:nvGrpSpPr>
         <p:grpSpPr>
           <a:xfrm>
-            <a:off x="246344" y="31722062"/>
-            <a:ext cx="3686415" cy="1097281"/>
+            <a:off x="225816" y="29078557"/>
+            <a:ext cx="3379214" cy="1005841"/>
             <a:chOff x="246344" y="31722062"/>
             <a:chExt cx="3686415" cy="1097281"/>
           </a:xfrm>
@@ -3518,8 +3496,8 @@
         </p:blipFill>
         <p:spPr bwMode="auto">
           <a:xfrm>
-            <a:off x="35538807" y="496768"/>
-            <a:ext cx="7732990" cy="2069708"/>
+            <a:off x="32577240" y="455371"/>
+            <a:ext cx="7088574" cy="1897232"/>
           </a:xfrm>
           <a:prstGeom prst="rect">
             <a:avLst/>
@@ -3537,7 +3515,7 @@
         </p:nvSpPr>
         <p:spPr>
           <a:xfrm>
-            <a:off x="2793810" y="24250584"/>
+            <a:off x="2560992" y="22229702"/>
             <a:ext cx="312906" cy="369332"/>
           </a:xfrm>
           <a:prstGeom prst="rect">
@@ -3570,7 +3548,7 @@
         </p:nvSpPr>
         <p:spPr>
           <a:xfrm>
-            <a:off x="6173322" y="24250584"/>
+            <a:off x="5658878" y="22229702"/>
             <a:ext cx="312906" cy="369332"/>
           </a:xfrm>
           <a:prstGeom prst="rect">
@@ -3603,7 +3581,7 @@
         </p:nvSpPr>
         <p:spPr>
           <a:xfrm>
-            <a:off x="6172580" y="27565270"/>
+            <a:off x="5658198" y="25268164"/>
             <a:ext cx="312906" cy="369332"/>
           </a:xfrm>
           <a:prstGeom prst="rect">
@@ -3636,7 +3614,7 @@
         </p:nvSpPr>
         <p:spPr>
           <a:xfrm>
-            <a:off x="2793977" y="27565270"/>
+            <a:off x="2561146" y="25268164"/>
             <a:ext cx="300082" cy="369332"/>
           </a:xfrm>
           <a:prstGeom prst="rect">
@@ -3669,8 +3647,8 @@
         </p:nvSpPr>
         <p:spPr>
           <a:xfrm>
-            <a:off x="592096" y="246293"/>
-            <a:ext cx="34612304" cy="2092881"/>
+            <a:off x="542755" y="225769"/>
+            <a:ext cx="31727945" cy="1926425"/>
           </a:xfrm>
           <a:prstGeom prst="rect">
             <a:avLst/>
@@ -3684,7 +3662,7 @@
           <a:lstStyle/>
           <a:p>
             <a:r>
-              <a:rPr lang="en-US" sz="6500" dirty="0">
+              <a:rPr lang="en-US" sz="5959" dirty="0">
                 <a:solidFill>
                   <a:schemeClr val="bg1"/>
                 </a:solidFill>
@@ -3704,8 +3682,8 @@
         </p:nvSpPr>
         <p:spPr>
           <a:xfrm>
-            <a:off x="643887" y="2143186"/>
-            <a:ext cx="33420201" cy="861774"/>
+            <a:off x="590230" y="1964587"/>
+            <a:ext cx="30635184" cy="797782"/>
           </a:xfrm>
           <a:prstGeom prst="rect">
             <a:avLst/>
@@ -3719,37 +3697,17 @@
           <a:lstStyle/>
           <a:p>
             <a:r>
-              <a:rPr lang="en-US" sz="5000" dirty="0">
+              <a:rPr lang="en-US" sz="4584" dirty="0">
                 <a:solidFill>
                   <a:schemeClr val="bg1"/>
                 </a:solidFill>
                 <a:latin typeface="Times New Roman" panose="02020603050405020304" pitchFamily="18" charset="0"/>
                 <a:cs typeface="Times New Roman" panose="02020603050405020304" pitchFamily="18" charset="0"/>
               </a:rPr>
-              <a:t>Jacob Lamers, Kent </a:t>
+              <a:t>Jacob Lamers, Kent MacLaughlin, Matthew </a:t>
             </a:r>
             <a:r>
-              <a:rPr lang="en-US" sz="5000" dirty="0" err="1">
-                <a:solidFill>
-                  <a:schemeClr val="bg1"/>
-                </a:solidFill>
-                <a:latin typeface="Times New Roman" panose="02020603050405020304" pitchFamily="18" charset="0"/>
-                <a:cs typeface="Times New Roman" panose="02020603050405020304" pitchFamily="18" charset="0"/>
-              </a:rPr>
-              <a:t>MacLaughlin</a:t>
-            </a:r>
-            <a:r>
-              <a:rPr lang="en-US" sz="5000" dirty="0">
-                <a:solidFill>
-                  <a:schemeClr val="bg1"/>
-                </a:solidFill>
-                <a:latin typeface="Times New Roman" panose="02020603050405020304" pitchFamily="18" charset="0"/>
-                <a:cs typeface="Times New Roman" panose="02020603050405020304" pitchFamily="18" charset="0"/>
-              </a:rPr>
-              <a:t>, Matthew </a:t>
-            </a:r>
-            <a:r>
-              <a:rPr lang="en-US" sz="5000" dirty="0" err="1">
+              <a:rPr lang="en-US" sz="4584" dirty="0" err="1">
                 <a:solidFill>
                   <a:schemeClr val="bg1"/>
                 </a:solidFill>
@@ -3759,14 +3717,14 @@
               <a:t>Marcou</a:t>
             </a:r>
             <a:r>
-              <a:rPr lang="en-US" sz="5000" dirty="0">
+              <a:rPr lang="en-US" sz="4584" dirty="0">
                 <a:solidFill>
                   <a:schemeClr val="bg1"/>
                 </a:solidFill>
                 <a:latin typeface="Times New Roman" panose="02020603050405020304" pitchFamily="18" charset="0"/>
                 <a:cs typeface="Times New Roman" panose="02020603050405020304" pitchFamily="18" charset="0"/>
               </a:rPr>
-              <a:t>, Rudolf Braun, Marlow Eldridge</a:t>
+              <a:t>, Rudolf Braun, Marlowe Eldridge</a:t>
             </a:r>
           </a:p>
         </p:txBody>
@@ -3793,8 +3751,8 @@
         </p:blipFill>
         <p:spPr>
           <a:xfrm>
-            <a:off x="937849" y="21624458"/>
-            <a:ext cx="13261226" cy="8002464"/>
+            <a:off x="859695" y="17886907"/>
+            <a:ext cx="12156124" cy="7335592"/>
           </a:xfrm>
           <a:prstGeom prst="rect">
             <a:avLst/>
@@ -3815,8 +3773,8 @@
         </p:nvSpPr>
         <p:spPr>
           <a:xfrm>
-            <a:off x="1099213" y="15966828"/>
-            <a:ext cx="12981262" cy="2400657"/>
+            <a:off x="1007612" y="14279577"/>
+            <a:ext cx="11899490" cy="2208682"/>
           </a:xfrm>
           <a:prstGeom prst="rect">
             <a:avLst/>
@@ -3830,7 +3788,7 @@
           <a:lstStyle/>
           <a:p>
             <a:r>
-              <a:rPr lang="en-US" sz="5000" dirty="0"/>
+              <a:rPr lang="en-US" sz="4584" dirty="0"/>
               <a:t>Determine the effect of hyperbaric treatment and concentrated oxygen on venous metabolites</a:t>
             </a:r>
           </a:p>
@@ -3850,8 +3808,8 @@
         </p:nvSpPr>
         <p:spPr>
           <a:xfrm>
-            <a:off x="29899189" y="21818788"/>
-            <a:ext cx="13335356" cy="5632311"/>
+            <a:off x="27354089" y="20071891"/>
+            <a:ext cx="12224076" cy="7146828"/>
           </a:xfrm>
           <a:prstGeom prst="rect">
             <a:avLst/>
@@ -3864,53 +3822,71 @@
           </a:bodyPr>
           <a:lstStyle/>
           <a:p>
-            <a:pPr marL="285750" indent="-285750">
+            <a:pPr marL="261947" indent="-261947">
               <a:buFont typeface="Arial" panose="020B0604020202020204" pitchFamily="34" charset="0"/>
               <a:buChar char="•"/>
             </a:pPr>
             <a:r>
-              <a:rPr lang="en-US" sz="4500" dirty="0"/>
+              <a:rPr lang="en-US" sz="4584" dirty="0"/>
               <a:t>Greater increase in plasma potassium in hyperbaric treatment group than concentrated oxygen</a:t>
             </a:r>
           </a:p>
           <a:p>
-            <a:pPr marL="285750" indent="-285750">
+            <a:pPr marL="261947" indent="-261947">
               <a:buFont typeface="Arial" panose="020B0604020202020204" pitchFamily="34" charset="0"/>
               <a:buChar char="•"/>
             </a:pPr>
             <a:r>
-              <a:rPr lang="en-US" sz="4500" dirty="0"/>
+              <a:rPr lang="en-US" sz="4584" dirty="0"/>
               <a:t>Possible explanations </a:t>
             </a:r>
           </a:p>
           <a:p>
-            <a:pPr marL="2480310" lvl="1" indent="-285750">
+            <a:pPr marL="2273700" lvl="1" indent="-261947">
               <a:buFont typeface="Arial" panose="020B0604020202020204" pitchFamily="34" charset="0"/>
               <a:buChar char="•"/>
             </a:pPr>
             <a:r>
-              <a:rPr lang="en-US" sz="4500" dirty="0"/>
-              <a:t>Increased CO2/N2 in chamber</a:t>
+              <a:rPr lang="en-US" sz="4584" dirty="0"/>
+              <a:t>Increase CO2 pressure</a:t>
             </a:r>
           </a:p>
           <a:p>
-            <a:pPr marL="2480310" lvl="1" indent="-285750">
+            <a:pPr marL="2273700" lvl="1" indent="-261947">
               <a:buFont typeface="Arial" panose="020B0604020202020204" pitchFamily="34" charset="0"/>
               <a:buChar char="•"/>
             </a:pPr>
             <a:r>
-              <a:rPr lang="en-US" sz="4500" dirty="0"/>
-              <a:t>Affects of increased pressure on vasoconstriction </a:t>
+              <a:rPr lang="en-US" sz="4584" dirty="0"/>
+              <a:t>Increase N2 pressure</a:t>
             </a:r>
           </a:p>
           <a:p>
-            <a:pPr marL="2480310" lvl="1" indent="-285750">
+            <a:pPr marL="2273700" lvl="1" indent="-261947">
               <a:buFont typeface="Arial" panose="020B0604020202020204" pitchFamily="34" charset="0"/>
               <a:buChar char="•"/>
             </a:pPr>
             <a:r>
-              <a:rPr lang="en-US" sz="4500" dirty="0"/>
-              <a:t>Changes in expression of K+ channels</a:t>
+              <a:rPr lang="en-US" sz="4584" dirty="0"/>
+              <a:t>Affects of increased pressure on vasoconstriction </a:t>
+            </a:r>
+          </a:p>
+          <a:p>
+            <a:pPr marL="2273700" lvl="1" indent="-261947">
+              <a:buFont typeface="Arial" panose="020B0604020202020204" pitchFamily="34" charset="0"/>
+              <a:buChar char="•"/>
+            </a:pPr>
+            <a:r>
+              <a:rPr lang="en-US" sz="4584" dirty="0"/>
+              <a:t>Changes in expression of K+ channels via HIF-1</a:t>
+            </a:r>
+            <a:r>
+              <a:rPr lang="el-GR" sz="4584" dirty="0"/>
+              <a:t>α</a:t>
+            </a:r>
+            <a:r>
+              <a:rPr lang="en-US" sz="4584" dirty="0"/>
+              <a:t> related response</a:t>
             </a:r>
           </a:p>
         </p:txBody>
@@ -3929,8 +3905,8 @@
         </p:nvSpPr>
         <p:spPr>
           <a:xfrm>
-            <a:off x="937849" y="5169276"/>
-            <a:ext cx="13030200" cy="8556188"/>
+            <a:off x="859695" y="4738503"/>
+            <a:ext cx="11944350" cy="7851508"/>
           </a:xfrm>
           <a:prstGeom prst="rect">
             <a:avLst/>
@@ -3943,58 +3919,58 @@
           </a:bodyPr>
           <a:lstStyle/>
           <a:p>
-            <a:pPr marL="685800" indent="-685800">
+            <a:pPr marL="628673" indent="-628673">
               <a:buFont typeface="Arial" panose="020B0604020202020204" pitchFamily="34" charset="0"/>
               <a:buChar char="•"/>
             </a:pPr>
             <a:r>
-              <a:rPr lang="en-US" sz="5500" dirty="0"/>
+              <a:rPr lang="en-US" sz="5042" dirty="0"/>
               <a:t>Changes in pressure and oxygen concentration can be used to modulate oxygen levels in humans</a:t>
             </a:r>
           </a:p>
           <a:p>
-            <a:pPr marL="685800" indent="-685800">
+            <a:pPr marL="628673" indent="-628673">
               <a:buFont typeface="Arial" panose="020B0604020202020204" pitchFamily="34" charset="0"/>
               <a:buChar char="•"/>
             </a:pPr>
             <a:r>
-              <a:rPr lang="en-US" sz="5500" dirty="0"/>
+              <a:rPr lang="en-US" sz="5042" dirty="0"/>
               <a:t>Hyperoxia has been linked to increases in plasma potassium </a:t>
             </a:r>
           </a:p>
           <a:p>
-            <a:pPr marL="685800" indent="-685800">
+            <a:pPr marL="628673" indent="-628673">
               <a:buFont typeface="Arial" panose="020B0604020202020204" pitchFamily="34" charset="0"/>
               <a:buChar char="•"/>
             </a:pPr>
             <a:r>
-              <a:rPr lang="en-US" sz="5500" dirty="0"/>
+              <a:rPr lang="en-US" sz="5042" dirty="0"/>
               <a:t>Effects of </a:t>
             </a:r>
             <a:r>
-              <a:rPr lang="en-US" sz="5500" dirty="0" err="1"/>
+              <a:rPr lang="en-US" sz="5042" dirty="0" err="1"/>
               <a:t>hyperbaria</a:t>
             </a:r>
             <a:r>
-              <a:rPr lang="en-US" sz="5500" dirty="0"/>
+              <a:rPr lang="en-US" sz="5042" dirty="0"/>
               <a:t> on plasma potassium levels remain understudied</a:t>
             </a:r>
           </a:p>
           <a:p>
-            <a:pPr marL="685800" indent="-685800">
+            <a:pPr marL="628673" indent="-628673">
               <a:buFont typeface="Arial" panose="020B0604020202020204" pitchFamily="34" charset="0"/>
               <a:buChar char="•"/>
             </a:pPr>
             <a:r>
-              <a:rPr lang="en-US" sz="5500" dirty="0"/>
+              <a:rPr lang="en-US" sz="5042" dirty="0"/>
               <a:t>Hypoxia has been linked to changes in plasma potassium levels via HIF-1</a:t>
             </a:r>
             <a:r>
-              <a:rPr lang="el-GR" sz="5500" dirty="0"/>
+              <a:rPr lang="el-GR" sz="5042" dirty="0"/>
               <a:t>α</a:t>
             </a:r>
             <a:r>
-              <a:rPr lang="en-US" sz="5500" dirty="0"/>
+              <a:rPr lang="en-US" sz="5042" dirty="0"/>
               <a:t>  pathway</a:t>
             </a:r>
           </a:p>
@@ -4002,10 +3978,10 @@
       </p:sp>
       <p:pic>
         <p:nvPicPr>
-          <p:cNvPr id="32" name="Picture 31">
+          <p:cNvPr id="39" name="Picture 38">
             <a:extLst>
               <a:ext uri="{FF2B5EF4-FFF2-40B4-BE49-F238E27FC236}">
-                <a16:creationId xmlns:a16="http://schemas.microsoft.com/office/drawing/2014/main" id="{8B8AE941-0278-4952-B4DA-1BFD20CB987D}"/>
+                <a16:creationId xmlns:a16="http://schemas.microsoft.com/office/drawing/2014/main" id="{FC51F5AB-4DB7-43DB-889C-35288A9AE4AD}"/>
               </a:ext>
             </a:extLst>
           </p:cNvPr>
@@ -4022,68 +3998,8 @@
         </p:blipFill>
         <p:spPr>
           <a:xfrm>
-            <a:off x="15740929" y="5332630"/>
-            <a:ext cx="12365498" cy="11770594"/>
-          </a:xfrm>
-          <a:prstGeom prst="rect">
-            <a:avLst/>
-          </a:prstGeom>
-        </p:spPr>
-      </p:pic>
-      <p:pic>
-        <p:nvPicPr>
-          <p:cNvPr id="37" name="Picture 36">
-            <a:extLst>
-              <a:ext uri="{FF2B5EF4-FFF2-40B4-BE49-F238E27FC236}">
-                <a16:creationId xmlns:a16="http://schemas.microsoft.com/office/drawing/2014/main" id="{A64E18B6-6521-49A7-8967-A523F97C23F8}"/>
-              </a:ext>
-            </a:extLst>
-          </p:cNvPr>
-          <p:cNvPicPr>
-            <a:picLocks noChangeAspect="1"/>
-          </p:cNvPicPr>
-          <p:nvPr/>
-        </p:nvPicPr>
-        <p:blipFill>
-          <a:blip r:embed="rId9"/>
-          <a:stretch>
-            <a:fillRect/>
-          </a:stretch>
-        </p:blipFill>
-        <p:spPr>
-          <a:xfrm>
-            <a:off x="16137511" y="17748290"/>
-            <a:ext cx="11802768" cy="12235486"/>
-          </a:xfrm>
-          <a:prstGeom prst="rect">
-            <a:avLst/>
-          </a:prstGeom>
-        </p:spPr>
-      </p:pic>
-      <p:pic>
-        <p:nvPicPr>
-          <p:cNvPr id="39" name="Picture 38">
-            <a:extLst>
-              <a:ext uri="{FF2B5EF4-FFF2-40B4-BE49-F238E27FC236}">
-                <a16:creationId xmlns:a16="http://schemas.microsoft.com/office/drawing/2014/main" id="{FC51F5AB-4DB7-43DB-889C-35288A9AE4AD}"/>
-              </a:ext>
-            </a:extLst>
-          </p:cNvPr>
-          <p:cNvPicPr>
-            <a:picLocks noChangeAspect="1"/>
-          </p:cNvPicPr>
-          <p:nvPr/>
-        </p:nvPicPr>
-        <p:blipFill>
-          <a:blip r:embed="rId10"/>
-          <a:stretch>
-            <a:fillRect/>
-          </a:stretch>
-        </p:blipFill>
-        <p:spPr>
-          <a:xfrm>
-            <a:off x="31950314" y="5170014"/>
-            <a:ext cx="9466627" cy="7200900"/>
+            <a:off x="29287789" y="4739180"/>
+            <a:ext cx="8677741" cy="6600825"/>
           </a:xfrm>
           <a:prstGeom prst="rect">
             <a:avLst/>
@@ -4105,6 +4021,66 @@
           <p:nvPr/>
         </p:nvPicPr>
         <p:blipFill>
+          <a:blip r:embed="rId9"/>
+          <a:stretch>
+            <a:fillRect/>
+          </a:stretch>
+        </p:blipFill>
+        <p:spPr>
+          <a:xfrm>
+            <a:off x="29337095" y="11855128"/>
+            <a:ext cx="8677741" cy="6452394"/>
+          </a:xfrm>
+          <a:prstGeom prst="rect">
+            <a:avLst/>
+          </a:prstGeom>
+        </p:spPr>
+      </p:pic>
+      <p:pic>
+        <p:nvPicPr>
+          <p:cNvPr id="6" name="Picture 5">
+            <a:extLst>
+              <a:ext uri="{FF2B5EF4-FFF2-40B4-BE49-F238E27FC236}">
+                <a16:creationId xmlns:a16="http://schemas.microsoft.com/office/drawing/2014/main" id="{18258926-BBF4-4702-9ADE-5B722D386F6E}"/>
+              </a:ext>
+            </a:extLst>
+          </p:cNvPr>
+          <p:cNvPicPr>
+            <a:picLocks noChangeAspect="1"/>
+          </p:cNvPicPr>
+          <p:nvPr/>
+        </p:nvPicPr>
+        <p:blipFill>
+          <a:blip r:embed="rId10"/>
+          <a:stretch>
+            <a:fillRect/>
+          </a:stretch>
+        </p:blipFill>
+        <p:spPr>
+          <a:xfrm>
+            <a:off x="15223306" y="16058210"/>
+            <a:ext cx="10344027" cy="11541756"/>
+          </a:xfrm>
+          <a:prstGeom prst="rect">
+            <a:avLst/>
+          </a:prstGeom>
+        </p:spPr>
+      </p:pic>
+      <p:pic>
+        <p:nvPicPr>
+          <p:cNvPr id="23" name="Picture 22">
+            <a:extLst>
+              <a:ext uri="{FF2B5EF4-FFF2-40B4-BE49-F238E27FC236}">
+                <a16:creationId xmlns:a16="http://schemas.microsoft.com/office/drawing/2014/main" id="{F715F369-1C26-4AB7-A44F-C95F805EA486}"/>
+              </a:ext>
+            </a:extLst>
+          </p:cNvPr>
+          <p:cNvPicPr>
+            <a:picLocks noChangeAspect="1"/>
+          </p:cNvPicPr>
+          <p:nvPr/>
+        </p:nvPicPr>
+        <p:blipFill>
           <a:blip r:embed="rId11"/>
           <a:stretch>
             <a:fillRect/>
@@ -4112,8 +4088,8 @@
         </p:blipFill>
         <p:spPr>
           <a:xfrm>
-            <a:off x="32004103" y="12932867"/>
-            <a:ext cx="9466627" cy="7038975"/>
+            <a:off x="14779810" y="4663822"/>
+            <a:ext cx="10521716" cy="11462575"/>
           </a:xfrm>
           <a:prstGeom prst="rect">
             <a:avLst/>

</xml_diff>